<commit_message>
removed an old evaluation slide
</commit_message>
<xml_diff>
--- a/Session01/Session1_Slides.pptx
+++ b/Session01/Session1_Slides.pptx
@@ -5,10 +5,10 @@
     <p:sldMasterId id="2147483648" r:id="rId1"/>
   </p:sldMasterIdLst>
   <p:notesMasterIdLst>
-    <p:notesMasterId r:id="rId72"/>
+    <p:notesMasterId r:id="rId71"/>
   </p:notesMasterIdLst>
   <p:handoutMasterIdLst>
-    <p:handoutMasterId r:id="rId73"/>
+    <p:handoutMasterId r:id="rId72"/>
   </p:handoutMasterIdLst>
   <p:sldIdLst>
     <p:sldId id="256" r:id="rId2"/>
@@ -80,7 +80,6 @@
     <p:sldId id="344" r:id="rId68"/>
     <p:sldId id="345" r:id="rId69"/>
     <p:sldId id="346" r:id="rId70"/>
-    <p:sldId id="347" r:id="rId71"/>
   </p:sldIdLst>
   <p:sldSz cx="13004800" cy="9753600"/>
   <p:notesSz cx="6858000" cy="9144000"/>
@@ -933,7 +932,7 @@
           <a:p>
             <a:fld id="{5B849520-1930-4CF7-AFD0-1B7449654BAD}" type="datetimeFigureOut">
               <a:rPr lang="en-US" smtClean="0"/>
-              <a:t>9/15/2020</a:t>
+              <a:t>6/25/23</a:t>
             </a:fld>
             <a:endParaRPr lang="en-US"/>
           </a:p>
@@ -1212,12 +1211,12 @@
 </file>
 
 <file path=ppt/slideLayouts/slideLayout1.xml><?xml version="1.0" encoding="utf-8"?>
-<p:sldLayout xmlns:a="http://schemas.openxmlformats.org/drawingml/2006/main" xmlns:r="http://schemas.openxmlformats.org/officeDocument/2006/relationships" xmlns:p="http://schemas.openxmlformats.org/presentationml/2006/main" userDrawn="1">
-  <p:cSld name="Title &amp; Subtitle">
+<p:sldLayout xmlns:a="http://schemas.openxmlformats.org/drawingml/2006/main" xmlns:r="http://schemas.openxmlformats.org/officeDocument/2006/relationships" xmlns:p="http://schemas.openxmlformats.org/presentationml/2006/main" type="tx">
+  <p:cSld name="Title &amp; Subtitle Alt">
     <p:bg>
       <p:bgPr>
         <a:solidFill>
-          <a:srgbClr val="222222"/>
+          <a:srgbClr val="FFFFFF"/>
         </a:solidFill>
         <a:effectLst/>
       </p:bgPr>
@@ -1238,7 +1237,7 @@
       </p:grpSpPr>
       <p:sp>
         <p:nvSpPr>
-          <p:cNvPr id="11" name="Shape 11"/>
+          <p:cNvPr id="32" name="Shape 32"/>
           <p:cNvSpPr/>
           <p:nvPr/>
         </p:nvSpPr>
@@ -1274,12 +1273,56 @@
       </p:sp>
       <p:sp>
         <p:nvSpPr>
-          <p:cNvPr id="13" name="Shape 13"/>
+          <p:cNvPr id="33" name="Shape 33"/>
           <p:cNvSpPr>
             <a:spLocks noGrp="1"/>
           </p:cNvSpPr>
           <p:nvPr>
-            <p:ph type="body" sz="quarter" idx="1" hasCustomPrompt="1"/>
+            <p:ph type="title"/>
+          </p:nvPr>
+        </p:nvSpPr>
+        <p:spPr>
+          <a:xfrm>
+            <a:off x="406400" y="6426200"/>
+            <a:ext cx="12192000" cy="2705100"/>
+          </a:xfrm>
+          <a:prstGeom prst="rect">
+            <a:avLst/>
+          </a:prstGeom>
+        </p:spPr>
+        <p:txBody>
+          <a:bodyPr lIns="50800" tIns="50800" rIns="50800" bIns="50800" anchor="t"/>
+          <a:lstStyle>
+            <a:lvl1pPr algn="l" defTabSz="584200">
+              <a:lnSpc>
+                <a:spcPct val="80000"/>
+              </a:lnSpc>
+              <a:defRPr sz="17000" cap="all">
+                <a:solidFill>
+                  <a:schemeClr val="accent1"/>
+                </a:solidFill>
+                <a:latin typeface="DIN Condensed"/>
+                <a:ea typeface="DIN Condensed"/>
+                <a:cs typeface="DIN Condensed"/>
+                <a:sym typeface="DIN Condensed"/>
+              </a:defRPr>
+            </a:lvl1pPr>
+          </a:lstStyle>
+          <a:p>
+            <a:r>
+              <a:t>Title Text</a:t>
+            </a:r>
+          </a:p>
+        </p:txBody>
+      </p:sp>
+      <p:sp>
+        <p:nvSpPr>
+          <p:cNvPr id="34" name="Shape 34"/>
+          <p:cNvSpPr>
+            <a:spLocks noGrp="1"/>
+          </p:cNvSpPr>
+          <p:nvPr>
+            <p:ph type="body" sz="quarter" idx="1"/>
           </p:nvPr>
         </p:nvSpPr>
         <p:spPr>
@@ -1292,9 +1335,7 @@
           </a:prstGeom>
         </p:spPr>
         <p:txBody>
-          <a:bodyPr lIns="50800" tIns="50800" rIns="50800" bIns="50800" anchor="b">
-            <a:normAutofit/>
-          </a:bodyPr>
+          <a:bodyPr lIns="50800" tIns="50800" rIns="50800" bIns="50800" anchor="b"/>
           <a:lstStyle>
             <a:lvl1pPr marL="0" indent="0" defTabSz="584200">
               <a:lnSpc>
@@ -1399,35 +1440,30 @@
           </a:lstStyle>
           <a:p>
             <a:r>
-              <a:rPr dirty="0"/>
               <a:t>Body Level One</a:t>
             </a:r>
           </a:p>
           <a:p>
             <a:pPr lvl="1"/>
             <a:r>
-              <a:rPr dirty="0"/>
               <a:t>Body Level Two</a:t>
             </a:r>
           </a:p>
           <a:p>
             <a:pPr lvl="2"/>
             <a:r>
-              <a:rPr dirty="0"/>
               <a:t>Body Level Three</a:t>
             </a:r>
           </a:p>
           <a:p>
             <a:pPr lvl="3"/>
             <a:r>
-              <a:rPr dirty="0"/>
               <a:t>Body Level Four</a:t>
             </a:r>
           </a:p>
           <a:p>
             <a:pPr lvl="4"/>
             <a:r>
-              <a:rPr dirty="0"/>
               <a:t>Body Level Five</a:t>
             </a:r>
           </a:p>
@@ -1435,7 +1471,7 @@
       </p:sp>
       <p:sp>
         <p:nvSpPr>
-          <p:cNvPr id="14" name="Shape 14"/>
+          <p:cNvPr id="35" name="Shape 35"/>
           <p:cNvSpPr>
             <a:spLocks noGrp="1"/>
           </p:cNvSpPr>
@@ -1445,7 +1481,7 @@
         </p:nvSpPr>
         <p:spPr>
           <a:xfrm>
-            <a:off x="12194441" y="431800"/>
+            <a:off x="12161860" y="419100"/>
             <a:ext cx="406897" cy="457200"/>
           </a:xfrm>
           <a:prstGeom prst="rect">
@@ -1474,52 +1510,7 @@
             <a:fld id="{86CB4B4D-7CA3-9044-876B-883B54F8677D}" type="slidenum">
               <a:t>‹#›</a:t>
             </a:fld>
-            <a:endParaRPr dirty="0"/>
-          </a:p>
-        </p:txBody>
-      </p:sp>
-      <p:sp>
-        <p:nvSpPr>
-          <p:cNvPr id="3" name="Text Placeholder 2">
-            <a:extLst>
-              <a:ext uri="{FF2B5EF4-FFF2-40B4-BE49-F238E27FC236}">
-                <a16:creationId xmlns:a16="http://schemas.microsoft.com/office/drawing/2014/main" id="{C04EF4C7-DCD8-4996-8B1C-9B32FC5EA788}"/>
-              </a:ext>
-            </a:extLst>
-          </p:cNvPr>
-          <p:cNvSpPr>
-            <a:spLocks noGrp="1"/>
-          </p:cNvSpPr>
-          <p:nvPr>
-            <p:ph type="body" sz="quarter" idx="10" hasCustomPrompt="1"/>
-          </p:nvPr>
-        </p:nvSpPr>
-        <p:spPr>
-          <a:xfrm>
-            <a:off x="406400" y="6446629"/>
-            <a:ext cx="12192000" cy="2875171"/>
-          </a:xfrm>
-        </p:spPr>
-        <p:txBody>
-          <a:bodyPr>
-            <a:normAutofit/>
-          </a:bodyPr>
-          <a:lstStyle>
-            <a:lvl1pPr marL="0" indent="0">
-              <a:buNone/>
-              <a:defRPr sz="17000" cap="all" baseline="0">
-                <a:solidFill>
-                  <a:schemeClr val="accent1"/>
-                </a:solidFill>
-              </a:defRPr>
-            </a:lvl1pPr>
-          </a:lstStyle>
-          <a:p>
-            <a:pPr lvl="0"/>
-            <a:r>
-              <a:rPr lang="en-US" dirty="0"/>
-              <a:t>Title Text</a:t>
-            </a:r>
+            <a:endParaRPr/>
           </a:p>
         </p:txBody>
       </p:sp>
@@ -1533,172 +1524,6 @@
 </file>
 
 <file path=ppt/slideLayouts/slideLayout10.xml><?xml version="1.0" encoding="utf-8"?>
-<p:sldLayout xmlns:a="http://schemas.openxmlformats.org/drawingml/2006/main" xmlns:r="http://schemas.openxmlformats.org/officeDocument/2006/relationships" xmlns:p="http://schemas.openxmlformats.org/presentationml/2006/main" type="tx">
-  <p:cSld name="Photo - 3 Up">
-    <p:bg>
-      <p:bgPr>
-        <a:solidFill>
-          <a:srgbClr val="222222"/>
-        </a:solidFill>
-        <a:effectLst/>
-      </p:bgPr>
-    </p:bg>
-    <p:spTree>
-      <p:nvGrpSpPr>
-        <p:cNvPr id="1" name=""/>
-        <p:cNvGrpSpPr/>
-        <p:nvPr/>
-      </p:nvGrpSpPr>
-      <p:grpSpPr>
-        <a:xfrm>
-          <a:off x="0" y="0"/>
-          <a:ext cx="0" cy="0"/>
-          <a:chOff x="0" y="0"/>
-          <a:chExt cx="0" cy="0"/>
-        </a:xfrm>
-      </p:grpSpPr>
-      <p:sp>
-        <p:nvSpPr>
-          <p:cNvPr id="115" name="Shape 115"/>
-          <p:cNvSpPr>
-            <a:spLocks noGrp="1"/>
-          </p:cNvSpPr>
-          <p:nvPr>
-            <p:ph type="pic" sz="half" idx="13"/>
-          </p:nvPr>
-        </p:nvSpPr>
-        <p:spPr>
-          <a:xfrm>
-            <a:off x="6503154" y="0"/>
-            <a:ext cx="6502401" cy="4864100"/>
-          </a:xfrm>
-          <a:prstGeom prst="rect">
-            <a:avLst/>
-          </a:prstGeom>
-        </p:spPr>
-        <p:txBody>
-          <a:bodyPr lIns="91439" tIns="45719" rIns="91439" bIns="45719">
-            <a:noAutofit/>
-          </a:bodyPr>
-          <a:lstStyle/>
-          <a:p>
-            <a:endParaRPr/>
-          </a:p>
-        </p:txBody>
-      </p:sp>
-      <p:sp>
-        <p:nvSpPr>
-          <p:cNvPr id="116" name="Shape 116"/>
-          <p:cNvSpPr>
-            <a:spLocks noGrp="1"/>
-          </p:cNvSpPr>
-          <p:nvPr>
-            <p:ph type="pic" sz="half" idx="14"/>
-          </p:nvPr>
-        </p:nvSpPr>
-        <p:spPr>
-          <a:xfrm>
-            <a:off x="6502400" y="4902200"/>
-            <a:ext cx="6502400" cy="4864100"/>
-          </a:xfrm>
-          <a:prstGeom prst="rect">
-            <a:avLst/>
-          </a:prstGeom>
-        </p:spPr>
-        <p:txBody>
-          <a:bodyPr lIns="91439" tIns="45719" rIns="91439" bIns="45719">
-            <a:noAutofit/>
-          </a:bodyPr>
-          <a:lstStyle/>
-          <a:p>
-            <a:endParaRPr/>
-          </a:p>
-        </p:txBody>
-      </p:sp>
-      <p:sp>
-        <p:nvSpPr>
-          <p:cNvPr id="117" name="Shape 117"/>
-          <p:cNvSpPr>
-            <a:spLocks noGrp="1"/>
-          </p:cNvSpPr>
-          <p:nvPr>
-            <p:ph type="pic" idx="15"/>
-          </p:nvPr>
-        </p:nvSpPr>
-        <p:spPr>
-          <a:xfrm>
-            <a:off x="0" y="0"/>
-            <a:ext cx="6468534" cy="9753600"/>
-          </a:xfrm>
-          <a:prstGeom prst="rect">
-            <a:avLst/>
-          </a:prstGeom>
-        </p:spPr>
-        <p:txBody>
-          <a:bodyPr lIns="91439" tIns="45719" rIns="91439" bIns="45719">
-            <a:noAutofit/>
-          </a:bodyPr>
-          <a:lstStyle/>
-          <a:p>
-            <a:endParaRPr/>
-          </a:p>
-        </p:txBody>
-      </p:sp>
-      <p:sp>
-        <p:nvSpPr>
-          <p:cNvPr id="118" name="Shape 118"/>
-          <p:cNvSpPr>
-            <a:spLocks noGrp="1"/>
-          </p:cNvSpPr>
-          <p:nvPr>
-            <p:ph type="sldNum" sz="quarter" idx="2"/>
-          </p:nvPr>
-        </p:nvSpPr>
-        <p:spPr>
-          <a:xfrm>
-            <a:off x="12186622" y="431800"/>
-            <a:ext cx="406897" cy="457200"/>
-          </a:xfrm>
-          <a:prstGeom prst="rect">
-            <a:avLst/>
-          </a:prstGeom>
-        </p:spPr>
-        <p:txBody>
-          <a:bodyPr lIns="50800" tIns="50800" rIns="50800" bIns="50800" anchor="t"/>
-          <a:lstStyle>
-            <a:lvl1pPr defTabSz="584200">
-              <a:lnSpc>
-                <a:spcPct val="80000"/>
-              </a:lnSpc>
-              <a:defRPr sz="2400">
-                <a:solidFill>
-                  <a:srgbClr val="838787"/>
-                </a:solidFill>
-                <a:latin typeface="DIN Alternate"/>
-                <a:ea typeface="DIN Alternate"/>
-                <a:cs typeface="DIN Alternate"/>
-                <a:sym typeface="DIN Alternate"/>
-              </a:defRPr>
-            </a:lvl1pPr>
-          </a:lstStyle>
-          <a:p>
-            <a:fld id="{86CB4B4D-7CA3-9044-876B-883B54F8677D}" type="slidenum">
-              <a:t>‹#›</a:t>
-            </a:fld>
-            <a:endParaRPr/>
-          </a:p>
-        </p:txBody>
-      </p:sp>
-    </p:spTree>
-  </p:cSld>
-  <p:clrMapOvr>
-    <a:masterClrMapping/>
-  </p:clrMapOvr>
-  <p:transition spd="med"/>
-</p:sldLayout>
-</file>
-
-<file path=ppt/slideLayouts/slideLayout11.xml><?xml version="1.0" encoding="utf-8"?>
 <p:sldLayout xmlns:a="http://schemas.openxmlformats.org/drawingml/2006/main" xmlns:r="http://schemas.openxmlformats.org/officeDocument/2006/relationships" xmlns:p="http://schemas.openxmlformats.org/presentationml/2006/main" type="tx">
   <p:cSld name="Quote">
     <p:bg>
@@ -2169,7 +1994,7 @@
 </p:sldLayout>
 </file>
 
-<file path=ppt/slideLayouts/slideLayout12.xml><?xml version="1.0" encoding="utf-8"?>
+<file path=ppt/slideLayouts/slideLayout11.xml><?xml version="1.0" encoding="utf-8"?>
 <p:sldLayout xmlns:a="http://schemas.openxmlformats.org/drawingml/2006/main" xmlns:r="http://schemas.openxmlformats.org/officeDocument/2006/relationships" xmlns:p="http://schemas.openxmlformats.org/presentationml/2006/main" type="tx">
   <p:cSld name="Quote Alt">
     <p:bg>
@@ -2475,7 +2300,7 @@
 </p:sldLayout>
 </file>
 
-<file path=ppt/slideLayouts/slideLayout13.xml><?xml version="1.0" encoding="utf-8"?>
+<file path=ppt/slideLayouts/slideLayout12.xml><?xml version="1.0" encoding="utf-8"?>
 <p:sldLayout xmlns:a="http://schemas.openxmlformats.org/drawingml/2006/main" xmlns:r="http://schemas.openxmlformats.org/officeDocument/2006/relationships" xmlns:p="http://schemas.openxmlformats.org/presentationml/2006/main" type="tx">
   <p:cSld name="Photo">
     <p:bg>
@@ -2583,7 +2408,7 @@
 </p:sldLayout>
 </file>
 
-<file path=ppt/slideLayouts/slideLayout14.xml><?xml version="1.0" encoding="utf-8"?>
+<file path=ppt/slideLayouts/slideLayout13.xml><?xml version="1.0" encoding="utf-8"?>
 <p:sldLayout xmlns:a="http://schemas.openxmlformats.org/drawingml/2006/main" xmlns:r="http://schemas.openxmlformats.org/officeDocument/2006/relationships" xmlns:p="http://schemas.openxmlformats.org/presentationml/2006/main" type="tx">
   <p:cSld name="Blank">
     <p:bg>
@@ -2662,7 +2487,7 @@
 </p:sldLayout>
 </file>
 
-<file path=ppt/slideLayouts/slideLayout15.xml><?xml version="1.0" encoding="utf-8"?>
+<file path=ppt/slideLayouts/slideLayout14.xml><?xml version="1.0" encoding="utf-8"?>
 <p:sldLayout xmlns:a="http://schemas.openxmlformats.org/drawingml/2006/main" xmlns:r="http://schemas.openxmlformats.org/officeDocument/2006/relationships" xmlns:p="http://schemas.openxmlformats.org/presentationml/2006/main" type="tx">
   <p:cSld name="Blank Alt">
     <p:bg>
@@ -2741,7 +2566,7 @@
 </p:sldLayout>
 </file>
 
-<file path=ppt/slideLayouts/slideLayout16.xml><?xml version="1.0" encoding="utf-8"?>
+<file path=ppt/slideLayouts/slideLayout15.xml><?xml version="1.0" encoding="utf-8"?>
 <p:sldLayout xmlns:a="http://schemas.openxmlformats.org/drawingml/2006/main" xmlns:r="http://schemas.openxmlformats.org/officeDocument/2006/relationships" xmlns:p="http://schemas.openxmlformats.org/presentationml/2006/main" type="tx">
   <p:cSld name="Title and Content">
     <p:spTree>
@@ -2867,7 +2692,7 @@
 </p:sldLayout>
 </file>
 
-<file path=ppt/slideLayouts/slideLayout17.xml><?xml version="1.0" encoding="utf-8"?>
+<file path=ppt/slideLayouts/slideLayout16.xml><?xml version="1.0" encoding="utf-8"?>
 <p:sldLayout xmlns:a="http://schemas.openxmlformats.org/drawingml/2006/main" xmlns:r="http://schemas.openxmlformats.org/officeDocument/2006/relationships" xmlns:p="http://schemas.openxmlformats.org/presentationml/2006/main" type="title">
   <p:cSld name="1_Title &amp; Subtitle">
     <p:bg>
@@ -3187,319 +3012,6 @@
 
 <file path=ppt/slideLayouts/slideLayout2.xml><?xml version="1.0" encoding="utf-8"?>
 <p:sldLayout xmlns:a="http://schemas.openxmlformats.org/drawingml/2006/main" xmlns:r="http://schemas.openxmlformats.org/officeDocument/2006/relationships" xmlns:p="http://schemas.openxmlformats.org/presentationml/2006/main" type="tx">
-  <p:cSld name="Title &amp; Subtitle Alt">
-    <p:bg>
-      <p:bgPr>
-        <a:solidFill>
-          <a:srgbClr val="FFFFFF"/>
-        </a:solidFill>
-        <a:effectLst/>
-      </p:bgPr>
-    </p:bg>
-    <p:spTree>
-      <p:nvGrpSpPr>
-        <p:cNvPr id="1" name=""/>
-        <p:cNvGrpSpPr/>
-        <p:nvPr/>
-      </p:nvGrpSpPr>
-      <p:grpSpPr>
-        <a:xfrm>
-          <a:off x="0" y="0"/>
-          <a:ext cx="0" cy="0"/>
-          <a:chOff x="0" y="0"/>
-          <a:chExt cx="0" cy="0"/>
-        </a:xfrm>
-      </p:grpSpPr>
-      <p:sp>
-        <p:nvSpPr>
-          <p:cNvPr id="32" name="Shape 32"/>
-          <p:cNvSpPr/>
-          <p:nvPr/>
-        </p:nvSpPr>
-        <p:spPr>
-          <a:xfrm flipV="1">
-            <a:off x="406400" y="6140894"/>
-            <a:ext cx="12192000" cy="264"/>
-          </a:xfrm>
-          <a:prstGeom prst="line">
-            <a:avLst/>
-          </a:prstGeom>
-          <a:ln w="38100">
-            <a:solidFill>
-              <a:srgbClr val="A6AAA9"/>
-            </a:solidFill>
-            <a:miter lim="400000"/>
-          </a:ln>
-        </p:spPr>
-        <p:txBody>
-          <a:bodyPr lIns="45718" tIns="45718" rIns="45718" bIns="45718"/>
-          <a:lstStyle/>
-          <a:p>
-            <a:pPr>
-              <a:defRPr>
-                <a:solidFill>
-                  <a:srgbClr val="838787"/>
-                </a:solidFill>
-              </a:defRPr>
-            </a:pPr>
-            <a:endParaRPr/>
-          </a:p>
-        </p:txBody>
-      </p:sp>
-      <p:sp>
-        <p:nvSpPr>
-          <p:cNvPr id="33" name="Shape 33"/>
-          <p:cNvSpPr>
-            <a:spLocks noGrp="1"/>
-          </p:cNvSpPr>
-          <p:nvPr>
-            <p:ph type="title"/>
-          </p:nvPr>
-        </p:nvSpPr>
-        <p:spPr>
-          <a:xfrm>
-            <a:off x="406400" y="6426200"/>
-            <a:ext cx="12192000" cy="2705100"/>
-          </a:xfrm>
-          <a:prstGeom prst="rect">
-            <a:avLst/>
-          </a:prstGeom>
-        </p:spPr>
-        <p:txBody>
-          <a:bodyPr lIns="50800" tIns="50800" rIns="50800" bIns="50800" anchor="t"/>
-          <a:lstStyle>
-            <a:lvl1pPr algn="l" defTabSz="584200">
-              <a:lnSpc>
-                <a:spcPct val="80000"/>
-              </a:lnSpc>
-              <a:defRPr sz="17000" cap="all">
-                <a:solidFill>
-                  <a:schemeClr val="accent1"/>
-                </a:solidFill>
-                <a:latin typeface="DIN Condensed"/>
-                <a:ea typeface="DIN Condensed"/>
-                <a:cs typeface="DIN Condensed"/>
-                <a:sym typeface="DIN Condensed"/>
-              </a:defRPr>
-            </a:lvl1pPr>
-          </a:lstStyle>
-          <a:p>
-            <a:r>
-              <a:t>Title Text</a:t>
-            </a:r>
-          </a:p>
-        </p:txBody>
-      </p:sp>
-      <p:sp>
-        <p:nvSpPr>
-          <p:cNvPr id="34" name="Shape 34"/>
-          <p:cNvSpPr>
-            <a:spLocks noGrp="1"/>
-          </p:cNvSpPr>
-          <p:nvPr>
-            <p:ph type="body" sz="quarter" idx="1"/>
-          </p:nvPr>
-        </p:nvSpPr>
-        <p:spPr>
-          <a:xfrm>
-            <a:off x="406400" y="4267200"/>
-            <a:ext cx="12192000" cy="1803400"/>
-          </a:xfrm>
-          <a:prstGeom prst="rect">
-            <a:avLst/>
-          </a:prstGeom>
-        </p:spPr>
-        <p:txBody>
-          <a:bodyPr lIns="50800" tIns="50800" rIns="50800" bIns="50800" anchor="b"/>
-          <a:lstStyle>
-            <a:lvl1pPr marL="0" indent="0" defTabSz="584200">
-              <a:lnSpc>
-                <a:spcPct val="80000"/>
-              </a:lnSpc>
-              <a:spcBef>
-                <a:spcPts val="2300"/>
-              </a:spcBef>
-              <a:buSzTx/>
-              <a:buFontTx/>
-              <a:buNone/>
-              <a:defRPr sz="5400" cap="all">
-                <a:solidFill>
-                  <a:srgbClr val="A6AAA9"/>
-                </a:solidFill>
-                <a:latin typeface="DIN Alternate"/>
-                <a:ea typeface="DIN Alternate"/>
-                <a:cs typeface="DIN Alternate"/>
-                <a:sym typeface="DIN Alternate"/>
-              </a:defRPr>
-            </a:lvl1pPr>
-            <a:lvl2pPr marL="0" indent="0" defTabSz="584200">
-              <a:lnSpc>
-                <a:spcPct val="80000"/>
-              </a:lnSpc>
-              <a:spcBef>
-                <a:spcPts val="2300"/>
-              </a:spcBef>
-              <a:buSzTx/>
-              <a:buFontTx/>
-              <a:buNone/>
-              <a:defRPr sz="5400" cap="all">
-                <a:solidFill>
-                  <a:srgbClr val="A6AAA9"/>
-                </a:solidFill>
-                <a:latin typeface="DIN Alternate"/>
-                <a:ea typeface="DIN Alternate"/>
-                <a:cs typeface="DIN Alternate"/>
-                <a:sym typeface="DIN Alternate"/>
-              </a:defRPr>
-            </a:lvl2pPr>
-            <a:lvl3pPr marL="0" indent="0" defTabSz="584200">
-              <a:lnSpc>
-                <a:spcPct val="80000"/>
-              </a:lnSpc>
-              <a:spcBef>
-                <a:spcPts val="2300"/>
-              </a:spcBef>
-              <a:buSzTx/>
-              <a:buFontTx/>
-              <a:buNone/>
-              <a:defRPr sz="5400" cap="all">
-                <a:solidFill>
-                  <a:srgbClr val="A6AAA9"/>
-                </a:solidFill>
-                <a:latin typeface="DIN Alternate"/>
-                <a:ea typeface="DIN Alternate"/>
-                <a:cs typeface="DIN Alternate"/>
-                <a:sym typeface="DIN Alternate"/>
-              </a:defRPr>
-            </a:lvl3pPr>
-            <a:lvl4pPr marL="0" indent="0" defTabSz="584200">
-              <a:lnSpc>
-                <a:spcPct val="80000"/>
-              </a:lnSpc>
-              <a:spcBef>
-                <a:spcPts val="2300"/>
-              </a:spcBef>
-              <a:buSzTx/>
-              <a:buFontTx/>
-              <a:buNone/>
-              <a:defRPr sz="5400" cap="all">
-                <a:solidFill>
-                  <a:srgbClr val="A6AAA9"/>
-                </a:solidFill>
-                <a:latin typeface="DIN Alternate"/>
-                <a:ea typeface="DIN Alternate"/>
-                <a:cs typeface="DIN Alternate"/>
-                <a:sym typeface="DIN Alternate"/>
-              </a:defRPr>
-            </a:lvl4pPr>
-            <a:lvl5pPr marL="0" indent="0" defTabSz="584200">
-              <a:lnSpc>
-                <a:spcPct val="80000"/>
-              </a:lnSpc>
-              <a:spcBef>
-                <a:spcPts val="2300"/>
-              </a:spcBef>
-              <a:buSzTx/>
-              <a:buFontTx/>
-              <a:buNone/>
-              <a:defRPr sz="5400" cap="all">
-                <a:solidFill>
-                  <a:srgbClr val="A6AAA9"/>
-                </a:solidFill>
-                <a:latin typeface="DIN Alternate"/>
-                <a:ea typeface="DIN Alternate"/>
-                <a:cs typeface="DIN Alternate"/>
-                <a:sym typeface="DIN Alternate"/>
-              </a:defRPr>
-            </a:lvl5pPr>
-          </a:lstStyle>
-          <a:p>
-            <a:r>
-              <a:t>Body Level One</a:t>
-            </a:r>
-          </a:p>
-          <a:p>
-            <a:pPr lvl="1"/>
-            <a:r>
-              <a:t>Body Level Two</a:t>
-            </a:r>
-          </a:p>
-          <a:p>
-            <a:pPr lvl="2"/>
-            <a:r>
-              <a:t>Body Level Three</a:t>
-            </a:r>
-          </a:p>
-          <a:p>
-            <a:pPr lvl="3"/>
-            <a:r>
-              <a:t>Body Level Four</a:t>
-            </a:r>
-          </a:p>
-          <a:p>
-            <a:pPr lvl="4"/>
-            <a:r>
-              <a:t>Body Level Five</a:t>
-            </a:r>
-          </a:p>
-        </p:txBody>
-      </p:sp>
-      <p:sp>
-        <p:nvSpPr>
-          <p:cNvPr id="35" name="Shape 35"/>
-          <p:cNvSpPr>
-            <a:spLocks noGrp="1"/>
-          </p:cNvSpPr>
-          <p:nvPr>
-            <p:ph type="sldNum" sz="quarter" idx="2"/>
-          </p:nvPr>
-        </p:nvSpPr>
-        <p:spPr>
-          <a:xfrm>
-            <a:off x="12161860" y="419100"/>
-            <a:ext cx="406897" cy="457200"/>
-          </a:xfrm>
-          <a:prstGeom prst="rect">
-            <a:avLst/>
-          </a:prstGeom>
-        </p:spPr>
-        <p:txBody>
-          <a:bodyPr lIns="50800" tIns="50800" rIns="50800" bIns="50800" anchor="t"/>
-          <a:lstStyle>
-            <a:lvl1pPr defTabSz="584200">
-              <a:lnSpc>
-                <a:spcPct val="80000"/>
-              </a:lnSpc>
-              <a:defRPr sz="2400">
-                <a:solidFill>
-                  <a:srgbClr val="838787"/>
-                </a:solidFill>
-                <a:latin typeface="DIN Alternate"/>
-                <a:ea typeface="DIN Alternate"/>
-                <a:cs typeface="DIN Alternate"/>
-                <a:sym typeface="DIN Alternate"/>
-              </a:defRPr>
-            </a:lvl1pPr>
-          </a:lstStyle>
-          <a:p>
-            <a:fld id="{86CB4B4D-7CA3-9044-876B-883B54F8677D}" type="slidenum">
-              <a:t>‹#›</a:t>
-            </a:fld>
-            <a:endParaRPr/>
-          </a:p>
-        </p:txBody>
-      </p:sp>
-    </p:spTree>
-  </p:cSld>
-  <p:clrMapOvr>
-    <a:masterClrMapping/>
-  </p:clrMapOvr>
-  <p:transition spd="med"/>
-</p:sldLayout>
-</file>
-
-<file path=ppt/slideLayouts/slideLayout3.xml><?xml version="1.0" encoding="utf-8"?>
-<p:sldLayout xmlns:a="http://schemas.openxmlformats.org/drawingml/2006/main" xmlns:r="http://schemas.openxmlformats.org/officeDocument/2006/relationships" xmlns:p="http://schemas.openxmlformats.org/presentationml/2006/main" type="tx">
   <p:cSld name="Title - Center">
     <p:bg>
       <p:bgPr>
@@ -3623,7 +3135,7 @@
 </p:sldLayout>
 </file>
 
-<file path=ppt/slideLayouts/slideLayout4.xml><?xml version="1.0" encoding="utf-8"?>
+<file path=ppt/slideLayouts/slideLayout3.xml><?xml version="1.0" encoding="utf-8"?>
 <p:sldLayout xmlns:a="http://schemas.openxmlformats.org/drawingml/2006/main" xmlns:r="http://schemas.openxmlformats.org/officeDocument/2006/relationships" xmlns:p="http://schemas.openxmlformats.org/presentationml/2006/main" type="tx">
   <p:cSld name="Photo - Vertical">
     <p:bg>
@@ -3972,7 +3484,7 @@
 </p:sldLayout>
 </file>
 
-<file path=ppt/slideLayouts/slideLayout5.xml><?xml version="1.0" encoding="utf-8"?>
+<file path=ppt/slideLayouts/slideLayout4.xml><?xml version="1.0" encoding="utf-8"?>
 <p:sldLayout xmlns:a="http://schemas.openxmlformats.org/drawingml/2006/main" xmlns:r="http://schemas.openxmlformats.org/officeDocument/2006/relationships" xmlns:p="http://schemas.openxmlformats.org/presentationml/2006/main" type="tx">
   <p:cSld name="Title - Top">
     <p:bg>
@@ -4288,7 +3800,7 @@
 </p:sldLayout>
 </file>
 
-<file path=ppt/slideLayouts/slideLayout6.xml><?xml version="1.0" encoding="utf-8"?>
+<file path=ppt/slideLayouts/slideLayout5.xml><?xml version="1.0" encoding="utf-8"?>
 <p:sldLayout xmlns:a="http://schemas.openxmlformats.org/drawingml/2006/main" xmlns:r="http://schemas.openxmlformats.org/officeDocument/2006/relationships" xmlns:p="http://schemas.openxmlformats.org/presentationml/2006/main" userDrawn="1">
   <p:cSld name="Title &amp; Bullets">
     <p:bg>
@@ -4553,7 +4065,7 @@
 </p:sldLayout>
 </file>
 
-<file path=ppt/slideLayouts/slideLayout7.xml><?xml version="1.0" encoding="utf-8"?>
+<file path=ppt/slideLayouts/slideLayout6.xml><?xml version="1.0" encoding="utf-8"?>
 <p:sldLayout xmlns:a="http://schemas.openxmlformats.org/drawingml/2006/main" xmlns:r="http://schemas.openxmlformats.org/officeDocument/2006/relationships" xmlns:p="http://schemas.openxmlformats.org/presentationml/2006/main" type="tx">
   <p:cSld name="Title &amp; Bullets Alt">
     <p:bg>
@@ -4916,7 +4428,7 @@
 </p:sldLayout>
 </file>
 
-<file path=ppt/slideLayouts/slideLayout8.xml><?xml version="1.0" encoding="utf-8"?>
+<file path=ppt/slideLayouts/slideLayout7.xml><?xml version="1.0" encoding="utf-8"?>
 <p:sldLayout xmlns:a="http://schemas.openxmlformats.org/drawingml/2006/main" xmlns:r="http://schemas.openxmlformats.org/officeDocument/2006/relationships" xmlns:p="http://schemas.openxmlformats.org/presentationml/2006/main" type="tx">
   <p:cSld name="Title, Bullets &amp; Photo">
     <p:bg>
@@ -5308,7 +4820,7 @@
 </p:sldLayout>
 </file>
 
-<file path=ppt/slideLayouts/slideLayout9.xml><?xml version="1.0" encoding="utf-8"?>
+<file path=ppt/slideLayouts/slideLayout8.xml><?xml version="1.0" encoding="utf-8"?>
 <p:sldLayout xmlns:a="http://schemas.openxmlformats.org/drawingml/2006/main" xmlns:r="http://schemas.openxmlformats.org/officeDocument/2006/relationships" xmlns:p="http://schemas.openxmlformats.org/presentationml/2006/main" type="tx">
   <p:cSld name="Bullets">
     <p:bg>
@@ -5573,6 +5085,172 @@
       <p:sp>
         <p:nvSpPr>
           <p:cNvPr id="108" name="Shape 108"/>
+          <p:cNvSpPr>
+            <a:spLocks noGrp="1"/>
+          </p:cNvSpPr>
+          <p:nvPr>
+            <p:ph type="sldNum" sz="quarter" idx="2"/>
+          </p:nvPr>
+        </p:nvSpPr>
+        <p:spPr>
+          <a:xfrm>
+            <a:off x="12186622" y="431800"/>
+            <a:ext cx="406897" cy="457200"/>
+          </a:xfrm>
+          <a:prstGeom prst="rect">
+            <a:avLst/>
+          </a:prstGeom>
+        </p:spPr>
+        <p:txBody>
+          <a:bodyPr lIns="50800" tIns="50800" rIns="50800" bIns="50800" anchor="t"/>
+          <a:lstStyle>
+            <a:lvl1pPr defTabSz="584200">
+              <a:lnSpc>
+                <a:spcPct val="80000"/>
+              </a:lnSpc>
+              <a:defRPr sz="2400">
+                <a:solidFill>
+                  <a:srgbClr val="838787"/>
+                </a:solidFill>
+                <a:latin typeface="DIN Alternate"/>
+                <a:ea typeface="DIN Alternate"/>
+                <a:cs typeface="DIN Alternate"/>
+                <a:sym typeface="DIN Alternate"/>
+              </a:defRPr>
+            </a:lvl1pPr>
+          </a:lstStyle>
+          <a:p>
+            <a:fld id="{86CB4B4D-7CA3-9044-876B-883B54F8677D}" type="slidenum">
+              <a:t>‹#›</a:t>
+            </a:fld>
+            <a:endParaRPr/>
+          </a:p>
+        </p:txBody>
+      </p:sp>
+    </p:spTree>
+  </p:cSld>
+  <p:clrMapOvr>
+    <a:masterClrMapping/>
+  </p:clrMapOvr>
+  <p:transition spd="med"/>
+</p:sldLayout>
+</file>
+
+<file path=ppt/slideLayouts/slideLayout9.xml><?xml version="1.0" encoding="utf-8"?>
+<p:sldLayout xmlns:a="http://schemas.openxmlformats.org/drawingml/2006/main" xmlns:r="http://schemas.openxmlformats.org/officeDocument/2006/relationships" xmlns:p="http://schemas.openxmlformats.org/presentationml/2006/main" type="tx">
+  <p:cSld name="Photo - 3 Up">
+    <p:bg>
+      <p:bgPr>
+        <a:solidFill>
+          <a:srgbClr val="222222"/>
+        </a:solidFill>
+        <a:effectLst/>
+      </p:bgPr>
+    </p:bg>
+    <p:spTree>
+      <p:nvGrpSpPr>
+        <p:cNvPr id="1" name=""/>
+        <p:cNvGrpSpPr/>
+        <p:nvPr/>
+      </p:nvGrpSpPr>
+      <p:grpSpPr>
+        <a:xfrm>
+          <a:off x="0" y="0"/>
+          <a:ext cx="0" cy="0"/>
+          <a:chOff x="0" y="0"/>
+          <a:chExt cx="0" cy="0"/>
+        </a:xfrm>
+      </p:grpSpPr>
+      <p:sp>
+        <p:nvSpPr>
+          <p:cNvPr id="115" name="Shape 115"/>
+          <p:cNvSpPr>
+            <a:spLocks noGrp="1"/>
+          </p:cNvSpPr>
+          <p:nvPr>
+            <p:ph type="pic" sz="half" idx="13"/>
+          </p:nvPr>
+        </p:nvSpPr>
+        <p:spPr>
+          <a:xfrm>
+            <a:off x="6503154" y="0"/>
+            <a:ext cx="6502401" cy="4864100"/>
+          </a:xfrm>
+          <a:prstGeom prst="rect">
+            <a:avLst/>
+          </a:prstGeom>
+        </p:spPr>
+        <p:txBody>
+          <a:bodyPr lIns="91439" tIns="45719" rIns="91439" bIns="45719">
+            <a:noAutofit/>
+          </a:bodyPr>
+          <a:lstStyle/>
+          <a:p>
+            <a:endParaRPr/>
+          </a:p>
+        </p:txBody>
+      </p:sp>
+      <p:sp>
+        <p:nvSpPr>
+          <p:cNvPr id="116" name="Shape 116"/>
+          <p:cNvSpPr>
+            <a:spLocks noGrp="1"/>
+          </p:cNvSpPr>
+          <p:nvPr>
+            <p:ph type="pic" sz="half" idx="14"/>
+          </p:nvPr>
+        </p:nvSpPr>
+        <p:spPr>
+          <a:xfrm>
+            <a:off x="6502400" y="4902200"/>
+            <a:ext cx="6502400" cy="4864100"/>
+          </a:xfrm>
+          <a:prstGeom prst="rect">
+            <a:avLst/>
+          </a:prstGeom>
+        </p:spPr>
+        <p:txBody>
+          <a:bodyPr lIns="91439" tIns="45719" rIns="91439" bIns="45719">
+            <a:noAutofit/>
+          </a:bodyPr>
+          <a:lstStyle/>
+          <a:p>
+            <a:endParaRPr/>
+          </a:p>
+        </p:txBody>
+      </p:sp>
+      <p:sp>
+        <p:nvSpPr>
+          <p:cNvPr id="117" name="Shape 117"/>
+          <p:cNvSpPr>
+            <a:spLocks noGrp="1"/>
+          </p:cNvSpPr>
+          <p:nvPr>
+            <p:ph type="pic" idx="15"/>
+          </p:nvPr>
+        </p:nvSpPr>
+        <p:spPr>
+          <a:xfrm>
+            <a:off x="0" y="0"/>
+            <a:ext cx="6468534" cy="9753600"/>
+          </a:xfrm>
+          <a:prstGeom prst="rect">
+            <a:avLst/>
+          </a:prstGeom>
+        </p:spPr>
+        <p:txBody>
+          <a:bodyPr lIns="91439" tIns="45719" rIns="91439" bIns="45719">
+            <a:noAutofit/>
+          </a:bodyPr>
+          <a:lstStyle/>
+          <a:p>
+            <a:endParaRPr/>
+          </a:p>
+        </p:txBody>
+      </p:sp>
+      <p:sp>
+        <p:nvSpPr>
+          <p:cNvPr id="118" name="Shape 118"/>
           <p:cNvSpPr>
             <a:spLocks noGrp="1"/>
           </p:cNvSpPr>
@@ -5672,7 +5350,7 @@
           </a:ln>
           <a:extLst>
             <a:ext uri="{C572A759-6A51-4108-AA02-DFA0A04FC94B}">
-              <ma14:wrappingTextBoxFlag xmlns:ma14="http://schemas.microsoft.com/office/mac/drawingml/2011/main" xmlns="" val="1"/>
+              <ma14:wrappingTextBoxFlag xmlns="" xmlns:ma14="http://schemas.microsoft.com/office/mac/drawingml/2011/main" val="1"/>
             </a:ext>
           </a:extLst>
         </p:spPr>
@@ -5711,7 +5389,7 @@
           </a:ln>
           <a:extLst>
             <a:ext uri="{C572A759-6A51-4108-AA02-DFA0A04FC94B}">
-              <ma14:wrappingTextBoxFlag xmlns:ma14="http://schemas.microsoft.com/office/mac/drawingml/2011/main" xmlns="" val="1"/>
+              <ma14:wrappingTextBoxFlag xmlns="" xmlns:ma14="http://schemas.microsoft.com/office/mac/drawingml/2011/main" val="1"/>
             </a:ext>
           </a:extLst>
         </p:spPr>
@@ -5810,23 +5488,22 @@
   </p:cSld>
   <p:clrMap bg1="lt1" tx1="dk1" bg2="lt2" tx2="dk2" accent1="accent1" accent2="accent2" accent3="accent3" accent4="accent4" accent5="accent5" accent6="accent6" hlink="hlink" folHlink="folHlink"/>
   <p:sldLayoutIdLst>
-    <p:sldLayoutId id="2147483649" r:id="rId1"/>
-    <p:sldLayoutId id="2147483651" r:id="rId2"/>
-    <p:sldLayoutId id="2147483652" r:id="rId3"/>
-    <p:sldLayoutId id="2147483653" r:id="rId4"/>
-    <p:sldLayoutId id="2147483654" r:id="rId5"/>
-    <p:sldLayoutId id="2147483655" r:id="rId6"/>
-    <p:sldLayoutId id="2147483656" r:id="rId7"/>
-    <p:sldLayoutId id="2147483657" r:id="rId8"/>
-    <p:sldLayoutId id="2147483658" r:id="rId9"/>
-    <p:sldLayoutId id="2147483659" r:id="rId10"/>
-    <p:sldLayoutId id="2147483660" r:id="rId11"/>
-    <p:sldLayoutId id="2147483661" r:id="rId12"/>
-    <p:sldLayoutId id="2147483662" r:id="rId13"/>
-    <p:sldLayoutId id="2147483663" r:id="rId14"/>
-    <p:sldLayoutId id="2147483664" r:id="rId15"/>
-    <p:sldLayoutId id="2147483665" r:id="rId16"/>
-    <p:sldLayoutId id="2147483666" r:id="rId17"/>
+    <p:sldLayoutId id="2147483651" r:id="rId1"/>
+    <p:sldLayoutId id="2147483652" r:id="rId2"/>
+    <p:sldLayoutId id="2147483653" r:id="rId3"/>
+    <p:sldLayoutId id="2147483654" r:id="rId4"/>
+    <p:sldLayoutId id="2147483655" r:id="rId5"/>
+    <p:sldLayoutId id="2147483656" r:id="rId6"/>
+    <p:sldLayoutId id="2147483657" r:id="rId7"/>
+    <p:sldLayoutId id="2147483658" r:id="rId8"/>
+    <p:sldLayoutId id="2147483659" r:id="rId9"/>
+    <p:sldLayoutId id="2147483660" r:id="rId10"/>
+    <p:sldLayoutId id="2147483661" r:id="rId11"/>
+    <p:sldLayoutId id="2147483662" r:id="rId12"/>
+    <p:sldLayoutId id="2147483663" r:id="rId13"/>
+    <p:sldLayoutId id="2147483664" r:id="rId14"/>
+    <p:sldLayoutId id="2147483665" r:id="rId15"/>
+    <p:sldLayoutId id="2147483666" r:id="rId16"/>
   </p:sldLayoutIdLst>
   <p:transition spd="med"/>
   <p:txStyles>
@@ -6906,7 +6583,7 @@
           </a:ln>
           <a:extLst>
             <a:ext uri="{C572A759-6A51-4108-AA02-DFA0A04FC94B}">
-              <ma14:wrappingTextBoxFlag xmlns:ma14="http://schemas.microsoft.com/office/mac/drawingml/2011/main" xmlns="" val="1"/>
+              <ma14:wrappingTextBoxFlag xmlns="" xmlns:ma14="http://schemas.microsoft.com/office/mac/drawingml/2011/main" val="1"/>
             </a:ext>
           </a:extLst>
         </p:spPr>
@@ -6955,7 +6632,7 @@
           </a:ln>
           <a:extLst>
             <a:ext uri="{C572A759-6A51-4108-AA02-DFA0A04FC94B}">
-              <ma14:wrappingTextBoxFlag xmlns:ma14="http://schemas.microsoft.com/office/mac/drawingml/2011/main" xmlns="" val="1"/>
+              <ma14:wrappingTextBoxFlag xmlns="" xmlns:ma14="http://schemas.microsoft.com/office/mac/drawingml/2011/main" val="1"/>
             </a:ext>
           </a:extLst>
         </p:spPr>
@@ -7066,7 +6743,7 @@
           </a:ln>
           <a:extLst>
             <a:ext uri="{C572A759-6A51-4108-AA02-DFA0A04FC94B}">
-              <ma14:wrappingTextBoxFlag xmlns:ma14="http://schemas.microsoft.com/office/mac/drawingml/2011/main" xmlns="" val="1"/>
+              <ma14:wrappingTextBoxFlag xmlns="" xmlns:ma14="http://schemas.microsoft.com/office/mac/drawingml/2011/main" val="1"/>
             </a:ext>
           </a:extLst>
         </p:spPr>
@@ -7113,7 +6790,7 @@
           </a:ln>
           <a:extLst>
             <a:ext uri="{C572A759-6A51-4108-AA02-DFA0A04FC94B}">
-              <ma14:wrappingTextBoxFlag xmlns:ma14="http://schemas.microsoft.com/office/mac/drawingml/2011/main" xmlns="" val="1"/>
+              <ma14:wrappingTextBoxFlag xmlns="" xmlns:ma14="http://schemas.microsoft.com/office/mac/drawingml/2011/main" val="1"/>
             </a:ext>
           </a:extLst>
         </p:spPr>
@@ -7214,7 +6891,7 @@
           </a:ln>
           <a:extLst>
             <a:ext uri="{C572A759-6A51-4108-AA02-DFA0A04FC94B}">
-              <ma14:wrappingTextBoxFlag xmlns:ma14="http://schemas.microsoft.com/office/mac/drawingml/2011/main" xmlns="" val="1"/>
+              <ma14:wrappingTextBoxFlag xmlns="" xmlns:ma14="http://schemas.microsoft.com/office/mac/drawingml/2011/main" val="1"/>
             </a:ext>
           </a:extLst>
         </p:spPr>
@@ -7368,7 +7045,7 @@
           </a:ln>
           <a:extLst>
             <a:ext uri="{C572A759-6A51-4108-AA02-DFA0A04FC94B}">
-              <ma14:wrappingTextBoxFlag xmlns:ma14="http://schemas.microsoft.com/office/mac/drawingml/2011/main" xmlns="" val="1"/>
+              <ma14:wrappingTextBoxFlag xmlns="" xmlns:ma14="http://schemas.microsoft.com/office/mac/drawingml/2011/main" val="1"/>
             </a:ext>
           </a:extLst>
         </p:spPr>
@@ -7415,7 +7092,7 @@
           </a:ln>
           <a:extLst>
             <a:ext uri="{C572A759-6A51-4108-AA02-DFA0A04FC94B}">
-              <ma14:wrappingTextBoxFlag xmlns:ma14="http://schemas.microsoft.com/office/mac/drawingml/2011/main" xmlns="" val="1"/>
+              <ma14:wrappingTextBoxFlag xmlns="" xmlns:ma14="http://schemas.microsoft.com/office/mac/drawingml/2011/main" val="1"/>
             </a:ext>
           </a:extLst>
         </p:spPr>
@@ -7507,7 +7184,7 @@
           </a:ln>
           <a:extLst>
             <a:ext uri="{C572A759-6A51-4108-AA02-DFA0A04FC94B}">
-              <ma14:wrappingTextBoxFlag xmlns:ma14="http://schemas.microsoft.com/office/mac/drawingml/2011/main" xmlns="" val="1"/>
+              <ma14:wrappingTextBoxFlag xmlns="" xmlns:ma14="http://schemas.microsoft.com/office/mac/drawingml/2011/main" val="1"/>
             </a:ext>
           </a:extLst>
         </p:spPr>
@@ -7714,7 +7391,7 @@
           </a:ln>
           <a:extLst>
             <a:ext uri="{C572A759-6A51-4108-AA02-DFA0A04FC94B}">
-              <ma14:wrappingTextBoxFlag xmlns:ma14="http://schemas.microsoft.com/office/mac/drawingml/2011/main" xmlns="" val="1"/>
+              <ma14:wrappingTextBoxFlag xmlns="" xmlns:ma14="http://schemas.microsoft.com/office/mac/drawingml/2011/main" val="1"/>
             </a:ext>
           </a:extLst>
         </p:spPr>
@@ -7823,7 +7500,7 @@
           </a:ln>
           <a:extLst>
             <a:ext uri="{C572A759-6A51-4108-AA02-DFA0A04FC94B}">
-              <ma14:wrappingTextBoxFlag xmlns:ma14="http://schemas.microsoft.com/office/mac/drawingml/2011/main" xmlns="" val="1"/>
+              <ma14:wrappingTextBoxFlag xmlns="" xmlns:ma14="http://schemas.microsoft.com/office/mac/drawingml/2011/main" val="1"/>
             </a:ext>
           </a:extLst>
         </p:spPr>
@@ -8016,7 +7693,7 @@
           </a:ln>
           <a:extLst>
             <a:ext uri="{C572A759-6A51-4108-AA02-DFA0A04FC94B}">
-              <ma14:wrappingTextBoxFlag xmlns:ma14="http://schemas.microsoft.com/office/mac/drawingml/2011/main" xmlns="" val="1"/>
+              <ma14:wrappingTextBoxFlag xmlns="" xmlns:ma14="http://schemas.microsoft.com/office/mac/drawingml/2011/main" val="1"/>
             </a:ext>
           </a:extLst>
         </p:spPr>
@@ -8147,7 +7824,7 @@
           </a:ln>
           <a:extLst>
             <a:ext uri="{C572A759-6A51-4108-AA02-DFA0A04FC94B}">
-              <ma14:wrappingTextBoxFlag xmlns:ma14="http://schemas.microsoft.com/office/mac/drawingml/2011/main" xmlns="" val="1"/>
+              <ma14:wrappingTextBoxFlag xmlns="" xmlns:ma14="http://schemas.microsoft.com/office/mac/drawingml/2011/main" val="1"/>
             </a:ext>
           </a:extLst>
         </p:spPr>
@@ -8256,7 +7933,7 @@
           </a:ln>
           <a:extLst>
             <a:ext uri="{C572A759-6A51-4108-AA02-DFA0A04FC94B}">
-              <ma14:wrappingTextBoxFlag xmlns:ma14="http://schemas.microsoft.com/office/mac/drawingml/2011/main" xmlns="" val="1"/>
+              <ma14:wrappingTextBoxFlag xmlns="" xmlns:ma14="http://schemas.microsoft.com/office/mac/drawingml/2011/main" val="1"/>
             </a:ext>
           </a:extLst>
         </p:spPr>
@@ -8387,7 +8064,7 @@
           </a:ln>
           <a:extLst>
             <a:ext uri="{C572A759-6A51-4108-AA02-DFA0A04FC94B}">
-              <ma14:wrappingTextBoxFlag xmlns:ma14="http://schemas.microsoft.com/office/mac/drawingml/2011/main" xmlns="" val="1"/>
+              <ma14:wrappingTextBoxFlag xmlns="" xmlns:ma14="http://schemas.microsoft.com/office/mac/drawingml/2011/main" val="1"/>
             </a:ext>
           </a:extLst>
         </p:spPr>
@@ -8692,7 +8369,7 @@
           </a:ln>
           <a:extLst>
             <a:ext uri="{C572A759-6A51-4108-AA02-DFA0A04FC94B}">
-              <ma14:wrappingTextBoxFlag xmlns:ma14="http://schemas.microsoft.com/office/mac/drawingml/2011/main" xmlns="" val="1"/>
+              <ma14:wrappingTextBoxFlag xmlns="" xmlns:ma14="http://schemas.microsoft.com/office/mac/drawingml/2011/main" val="1"/>
             </a:ext>
           </a:extLst>
         </p:spPr>
@@ -8823,7 +8500,7 @@
           </a:ln>
           <a:extLst>
             <a:ext uri="{C572A759-6A51-4108-AA02-DFA0A04FC94B}">
-              <ma14:wrappingTextBoxFlag xmlns:ma14="http://schemas.microsoft.com/office/mac/drawingml/2011/main" xmlns="" val="1"/>
+              <ma14:wrappingTextBoxFlag xmlns="" xmlns:ma14="http://schemas.microsoft.com/office/mac/drawingml/2011/main" val="1"/>
             </a:ext>
           </a:extLst>
         </p:spPr>
@@ -8954,7 +8631,7 @@
           </a:ln>
           <a:extLst>
             <a:ext uri="{C572A759-6A51-4108-AA02-DFA0A04FC94B}">
-              <ma14:wrappingTextBoxFlag xmlns:ma14="http://schemas.microsoft.com/office/mac/drawingml/2011/main" xmlns="" val="1"/>
+              <ma14:wrappingTextBoxFlag xmlns="" xmlns:ma14="http://schemas.microsoft.com/office/mac/drawingml/2011/main" val="1"/>
             </a:ext>
           </a:extLst>
         </p:spPr>
@@ -9063,7 +8740,7 @@
           </a:ln>
           <a:extLst>
             <a:ext uri="{C572A759-6A51-4108-AA02-DFA0A04FC94B}">
-              <ma14:wrappingTextBoxFlag xmlns:ma14="http://schemas.microsoft.com/office/mac/drawingml/2011/main" xmlns="" val="1"/>
+              <ma14:wrappingTextBoxFlag xmlns="" xmlns:ma14="http://schemas.microsoft.com/office/mac/drawingml/2011/main" val="1"/>
             </a:ext>
           </a:extLst>
         </p:spPr>
@@ -9194,7 +8871,7 @@
           </a:ln>
           <a:extLst>
             <a:ext uri="{C572A759-6A51-4108-AA02-DFA0A04FC94B}">
-              <ma14:wrappingTextBoxFlag xmlns:ma14="http://schemas.microsoft.com/office/mac/drawingml/2011/main" xmlns="" val="1"/>
+              <ma14:wrappingTextBoxFlag xmlns="" xmlns:ma14="http://schemas.microsoft.com/office/mac/drawingml/2011/main" val="1"/>
             </a:ext>
           </a:extLst>
         </p:spPr>
@@ -9325,7 +9002,7 @@
           </a:ln>
           <a:extLst>
             <a:ext uri="{C572A759-6A51-4108-AA02-DFA0A04FC94B}">
-              <ma14:wrappingTextBoxFlag xmlns:ma14="http://schemas.microsoft.com/office/mac/drawingml/2011/main" xmlns="" val="1"/>
+              <ma14:wrappingTextBoxFlag xmlns="" xmlns:ma14="http://schemas.microsoft.com/office/mac/drawingml/2011/main" val="1"/>
             </a:ext>
           </a:extLst>
         </p:spPr>
@@ -10920,7 +10597,7 @@
           </a:ln>
           <a:extLst>
             <a:ext uri="{C572A759-6A51-4108-AA02-DFA0A04FC94B}">
-              <ma14:wrappingTextBoxFlag xmlns:ma14="http://schemas.microsoft.com/office/mac/drawingml/2011/main" xmlns="" val="1"/>
+              <ma14:wrappingTextBoxFlag xmlns="" xmlns:ma14="http://schemas.microsoft.com/office/mac/drawingml/2011/main" val="1"/>
             </a:ext>
           </a:extLst>
         </p:spPr>
@@ -11029,7 +10706,7 @@
           </a:ln>
           <a:extLst>
             <a:ext uri="{C572A759-6A51-4108-AA02-DFA0A04FC94B}">
-              <ma14:wrappingTextBoxFlag xmlns:ma14="http://schemas.microsoft.com/office/mac/drawingml/2011/main" xmlns="" val="1"/>
+              <ma14:wrappingTextBoxFlag xmlns="" xmlns:ma14="http://schemas.microsoft.com/office/mac/drawingml/2011/main" val="1"/>
             </a:ext>
           </a:extLst>
         </p:spPr>
@@ -11121,7 +10798,7 @@
           </a:ln>
           <a:extLst>
             <a:ext uri="{C572A759-6A51-4108-AA02-DFA0A04FC94B}">
-              <ma14:wrappingTextBoxFlag xmlns:ma14="http://schemas.microsoft.com/office/mac/drawingml/2011/main" xmlns="" val="1"/>
+              <ma14:wrappingTextBoxFlag xmlns="" xmlns:ma14="http://schemas.microsoft.com/office/mac/drawingml/2011/main" val="1"/>
             </a:ext>
           </a:extLst>
         </p:spPr>
@@ -11364,7 +11041,7 @@
           </a:ln>
           <a:extLst>
             <a:ext uri="{C572A759-6A51-4108-AA02-DFA0A04FC94B}">
-              <ma14:wrappingTextBoxFlag xmlns:ma14="http://schemas.microsoft.com/office/mac/drawingml/2011/main" xmlns="" val="1"/>
+              <ma14:wrappingTextBoxFlag xmlns="" xmlns:ma14="http://schemas.microsoft.com/office/mac/drawingml/2011/main" val="1"/>
             </a:ext>
           </a:extLst>
         </p:spPr>
@@ -11490,7 +11167,7 @@
           </a:ln>
           <a:extLst>
             <a:ext uri="{C572A759-6A51-4108-AA02-DFA0A04FC94B}">
-              <ma14:wrappingTextBoxFlag xmlns:ma14="http://schemas.microsoft.com/office/mac/drawingml/2011/main" xmlns="" val="1"/>
+              <ma14:wrappingTextBoxFlag xmlns="" xmlns:ma14="http://schemas.microsoft.com/office/mac/drawingml/2011/main" val="1"/>
             </a:ext>
           </a:extLst>
         </p:spPr>
@@ -11537,7 +11214,7 @@
           </a:ln>
           <a:extLst>
             <a:ext uri="{C572A759-6A51-4108-AA02-DFA0A04FC94B}">
-              <ma14:wrappingTextBoxFlag xmlns:ma14="http://schemas.microsoft.com/office/mac/drawingml/2011/main" xmlns="" val="1"/>
+              <ma14:wrappingTextBoxFlag xmlns="" xmlns:ma14="http://schemas.microsoft.com/office/mac/drawingml/2011/main" val="1"/>
             </a:ext>
           </a:extLst>
         </p:spPr>
@@ -11664,7 +11341,7 @@
           </a:ln>
           <a:extLst>
             <a:ext uri="{C572A759-6A51-4108-AA02-DFA0A04FC94B}">
-              <ma14:wrappingTextBoxFlag xmlns:ma14="http://schemas.microsoft.com/office/mac/drawingml/2011/main" xmlns="" val="1"/>
+              <ma14:wrappingTextBoxFlag xmlns="" xmlns:ma14="http://schemas.microsoft.com/office/mac/drawingml/2011/main" val="1"/>
             </a:ext>
           </a:extLst>
         </p:spPr>
@@ -11901,7 +11578,7 @@
           </a:ln>
           <a:extLst>
             <a:ext uri="{C572A759-6A51-4108-AA02-DFA0A04FC94B}">
-              <ma14:wrappingTextBoxFlag xmlns:ma14="http://schemas.microsoft.com/office/mac/drawingml/2011/main" xmlns="" val="1"/>
+              <ma14:wrappingTextBoxFlag xmlns="" xmlns:ma14="http://schemas.microsoft.com/office/mac/drawingml/2011/main" val="1"/>
             </a:ext>
           </a:extLst>
         </p:spPr>
@@ -11948,7 +11625,7 @@
           </a:ln>
           <a:extLst>
             <a:ext uri="{C572A759-6A51-4108-AA02-DFA0A04FC94B}">
-              <ma14:wrappingTextBoxFlag xmlns:ma14="http://schemas.microsoft.com/office/mac/drawingml/2011/main" xmlns="" val="1"/>
+              <ma14:wrappingTextBoxFlag xmlns="" xmlns:ma14="http://schemas.microsoft.com/office/mac/drawingml/2011/main" val="1"/>
             </a:ext>
           </a:extLst>
         </p:spPr>
@@ -12075,7 +11752,7 @@
           </a:ln>
           <a:extLst>
             <a:ext uri="{C572A759-6A51-4108-AA02-DFA0A04FC94B}">
-              <ma14:wrappingTextBoxFlag xmlns:ma14="http://schemas.microsoft.com/office/mac/drawingml/2011/main" xmlns="" val="1"/>
+              <ma14:wrappingTextBoxFlag xmlns="" xmlns:ma14="http://schemas.microsoft.com/office/mac/drawingml/2011/main" val="1"/>
             </a:ext>
           </a:extLst>
         </p:spPr>
@@ -12201,7 +11878,7 @@
           </a:ln>
           <a:extLst>
             <a:ext uri="{C572A759-6A51-4108-AA02-DFA0A04FC94B}">
-              <ma14:wrappingTextBoxFlag xmlns:ma14="http://schemas.microsoft.com/office/mac/drawingml/2011/main" xmlns="" val="1"/>
+              <ma14:wrappingTextBoxFlag xmlns="" xmlns:ma14="http://schemas.microsoft.com/office/mac/drawingml/2011/main" val="1"/>
             </a:ext>
           </a:extLst>
         </p:spPr>
@@ -12248,7 +11925,7 @@
           </a:ln>
           <a:extLst>
             <a:ext uri="{C572A759-6A51-4108-AA02-DFA0A04FC94B}">
-              <ma14:wrappingTextBoxFlag xmlns:ma14="http://schemas.microsoft.com/office/mac/drawingml/2011/main" xmlns="" val="1"/>
+              <ma14:wrappingTextBoxFlag xmlns="" xmlns:ma14="http://schemas.microsoft.com/office/mac/drawingml/2011/main" val="1"/>
             </a:ext>
           </a:extLst>
         </p:spPr>
@@ -12621,7 +12298,7 @@
           </a:ln>
           <a:extLst>
             <a:ext uri="{C572A759-6A51-4108-AA02-DFA0A04FC94B}">
-              <ma14:wrappingTextBoxFlag xmlns:ma14="http://schemas.microsoft.com/office/mac/drawingml/2011/main" xmlns="" val="1"/>
+              <ma14:wrappingTextBoxFlag xmlns="" xmlns:ma14="http://schemas.microsoft.com/office/mac/drawingml/2011/main" val="1"/>
             </a:ext>
           </a:extLst>
         </p:spPr>
@@ -12730,7 +12407,7 @@
           </a:ln>
           <a:extLst>
             <a:ext uri="{C572A759-6A51-4108-AA02-DFA0A04FC94B}">
-              <ma14:wrappingTextBoxFlag xmlns:ma14="http://schemas.microsoft.com/office/mac/drawingml/2011/main" xmlns="" val="1"/>
+              <ma14:wrappingTextBoxFlag xmlns="" xmlns:ma14="http://schemas.microsoft.com/office/mac/drawingml/2011/main" val="1"/>
             </a:ext>
           </a:extLst>
         </p:spPr>
@@ -12777,7 +12454,7 @@
           </a:ln>
           <a:extLst>
             <a:ext uri="{C572A759-6A51-4108-AA02-DFA0A04FC94B}">
-              <ma14:wrappingTextBoxFlag xmlns:ma14="http://schemas.microsoft.com/office/mac/drawingml/2011/main" xmlns="" val="1"/>
+              <ma14:wrappingTextBoxFlag xmlns="" xmlns:ma14="http://schemas.microsoft.com/office/mac/drawingml/2011/main" val="1"/>
             </a:ext>
           </a:extLst>
         </p:spPr>
@@ -13029,7 +12706,7 @@
           </a:ln>
           <a:extLst>
             <a:ext uri="{C572A759-6A51-4108-AA02-DFA0A04FC94B}">
-              <ma14:wrappingTextBoxFlag xmlns:ma14="http://schemas.microsoft.com/office/mac/drawingml/2011/main" xmlns="" val="1"/>
+              <ma14:wrappingTextBoxFlag xmlns="" xmlns:ma14="http://schemas.microsoft.com/office/mac/drawingml/2011/main" val="1"/>
             </a:ext>
           </a:extLst>
         </p:spPr>
@@ -13076,7 +12753,7 @@
           </a:ln>
           <a:extLst>
             <a:ext uri="{C572A759-6A51-4108-AA02-DFA0A04FC94B}">
-              <ma14:wrappingTextBoxFlag xmlns:ma14="http://schemas.microsoft.com/office/mac/drawingml/2011/main" xmlns="" val="1"/>
+              <ma14:wrappingTextBoxFlag xmlns="" xmlns:ma14="http://schemas.microsoft.com/office/mac/drawingml/2011/main" val="1"/>
             </a:ext>
           </a:extLst>
         </p:spPr>
@@ -13206,7 +12883,7 @@
           </a:ln>
           <a:extLst>
             <a:ext uri="{C572A759-6A51-4108-AA02-DFA0A04FC94B}">
-              <ma14:wrappingTextBoxFlag xmlns:ma14="http://schemas.microsoft.com/office/mac/drawingml/2011/main" xmlns="" val="1"/>
+              <ma14:wrappingTextBoxFlag xmlns="" xmlns:ma14="http://schemas.microsoft.com/office/mac/drawingml/2011/main" val="1"/>
             </a:ext>
           </a:extLst>
         </p:spPr>
@@ -13315,7 +12992,7 @@
           </a:ln>
           <a:extLst>
             <a:ext uri="{C572A759-6A51-4108-AA02-DFA0A04FC94B}">
-              <ma14:wrappingTextBoxFlag xmlns:ma14="http://schemas.microsoft.com/office/mac/drawingml/2011/main" xmlns="" val="1"/>
+              <ma14:wrappingTextBoxFlag xmlns="" xmlns:ma14="http://schemas.microsoft.com/office/mac/drawingml/2011/main" val="1"/>
             </a:ext>
           </a:extLst>
         </p:spPr>
@@ -13434,7 +13111,7 @@
           </a:ln>
           <a:extLst>
             <a:ext uri="{C572A759-6A51-4108-AA02-DFA0A04FC94B}">
-              <ma14:wrappingTextBoxFlag xmlns:ma14="http://schemas.microsoft.com/office/mac/drawingml/2011/main" xmlns="" val="1"/>
+              <ma14:wrappingTextBoxFlag xmlns="" xmlns:ma14="http://schemas.microsoft.com/office/mac/drawingml/2011/main" val="1"/>
             </a:ext>
           </a:extLst>
         </p:spPr>
@@ -13536,7 +13213,7 @@
           </a:ln>
           <a:extLst>
             <a:ext uri="{C572A759-6A51-4108-AA02-DFA0A04FC94B}">
-              <ma14:wrappingTextBoxFlag xmlns:ma14="http://schemas.microsoft.com/office/mac/drawingml/2011/main" xmlns="" val="1"/>
+              <ma14:wrappingTextBoxFlag xmlns="" xmlns:ma14="http://schemas.microsoft.com/office/mac/drawingml/2011/main" val="1"/>
             </a:ext>
           </a:extLst>
         </p:spPr>
@@ -13744,7 +13421,7 @@
           </a:ln>
           <a:extLst>
             <a:ext uri="{C572A759-6A51-4108-AA02-DFA0A04FC94B}">
-              <ma14:wrappingTextBoxFlag xmlns:ma14="http://schemas.microsoft.com/office/mac/drawingml/2011/main" xmlns="" val="1"/>
+              <ma14:wrappingTextBoxFlag xmlns="" xmlns:ma14="http://schemas.microsoft.com/office/mac/drawingml/2011/main" val="1"/>
             </a:ext>
           </a:extLst>
         </p:spPr>
@@ -13857,7 +13534,7 @@
           </a:ln>
           <a:extLst>
             <a:ext uri="{C572A759-6A51-4108-AA02-DFA0A04FC94B}">
-              <ma14:wrappingTextBoxFlag xmlns:ma14="http://schemas.microsoft.com/office/mac/drawingml/2011/main" xmlns="" val="1"/>
+              <ma14:wrappingTextBoxFlag xmlns="" xmlns:ma14="http://schemas.microsoft.com/office/mac/drawingml/2011/main" val="1"/>
             </a:ext>
           </a:extLst>
         </p:spPr>
@@ -13966,7 +13643,7 @@
           </a:ln>
           <a:extLst>
             <a:ext uri="{C572A759-6A51-4108-AA02-DFA0A04FC94B}">
-              <ma14:wrappingTextBoxFlag xmlns:ma14="http://schemas.microsoft.com/office/mac/drawingml/2011/main" xmlns="" val="1"/>
+              <ma14:wrappingTextBoxFlag xmlns="" xmlns:ma14="http://schemas.microsoft.com/office/mac/drawingml/2011/main" val="1"/>
             </a:ext>
           </a:extLst>
         </p:spPr>
@@ -14068,7 +13745,7 @@
           </a:ln>
           <a:extLst>
             <a:ext uri="{C572A759-6A51-4108-AA02-DFA0A04FC94B}">
-              <ma14:wrappingTextBoxFlag xmlns:ma14="http://schemas.microsoft.com/office/mac/drawingml/2011/main" xmlns="" val="1"/>
+              <ma14:wrappingTextBoxFlag xmlns="" xmlns:ma14="http://schemas.microsoft.com/office/mac/drawingml/2011/main" val="1"/>
             </a:ext>
           </a:extLst>
         </p:spPr>
@@ -14317,7 +13994,7 @@
           </a:ln>
           <a:extLst>
             <a:ext uri="{C572A759-6A51-4108-AA02-DFA0A04FC94B}">
-              <ma14:wrappingTextBoxFlag xmlns:ma14="http://schemas.microsoft.com/office/mac/drawingml/2011/main" xmlns="" val="1"/>
+              <ma14:wrappingTextBoxFlag xmlns="" xmlns:ma14="http://schemas.microsoft.com/office/mac/drawingml/2011/main" val="1"/>
             </a:ext>
           </a:extLst>
         </p:spPr>
@@ -14507,7 +14184,7 @@
           </a:ln>
           <a:extLst>
             <a:ext uri="{C572A759-6A51-4108-AA02-DFA0A04FC94B}">
-              <ma14:wrappingTextBoxFlag xmlns:ma14="http://schemas.microsoft.com/office/mac/drawingml/2011/main" xmlns="" val="1"/>
+              <ma14:wrappingTextBoxFlag xmlns="" xmlns:ma14="http://schemas.microsoft.com/office/mac/drawingml/2011/main" val="1"/>
             </a:ext>
           </a:extLst>
         </p:spPr>
@@ -14644,7 +14321,7 @@
           </a:ln>
           <a:extLst>
             <a:ext uri="{C572A759-6A51-4108-AA02-DFA0A04FC94B}">
-              <ma14:wrappingTextBoxFlag xmlns:ma14="http://schemas.microsoft.com/office/mac/drawingml/2011/main" xmlns="" val="1"/>
+              <ma14:wrappingTextBoxFlag xmlns="" xmlns:ma14="http://schemas.microsoft.com/office/mac/drawingml/2011/main" val="1"/>
             </a:ext>
           </a:extLst>
         </p:spPr>
@@ -14850,7 +14527,7 @@
           </a:ln>
           <a:extLst>
             <a:ext uri="{C572A759-6A51-4108-AA02-DFA0A04FC94B}">
-              <ma14:wrappingTextBoxFlag xmlns:ma14="http://schemas.microsoft.com/office/mac/drawingml/2011/main" xmlns="" val="1"/>
+              <ma14:wrappingTextBoxFlag xmlns="" xmlns:ma14="http://schemas.microsoft.com/office/mac/drawingml/2011/main" val="1"/>
             </a:ext>
           </a:extLst>
         </p:spPr>
@@ -14981,7 +14658,7 @@
           </a:ln>
           <a:extLst>
             <a:ext uri="{C572A759-6A51-4108-AA02-DFA0A04FC94B}">
-              <ma14:wrappingTextBoxFlag xmlns:ma14="http://schemas.microsoft.com/office/mac/drawingml/2011/main" xmlns="" val="1"/>
+              <ma14:wrappingTextBoxFlag xmlns="" xmlns:ma14="http://schemas.microsoft.com/office/mac/drawingml/2011/main" val="1"/>
             </a:ext>
           </a:extLst>
         </p:spPr>
@@ -15315,7 +14992,7 @@
           </a:ln>
           <a:extLst>
             <a:ext uri="{C572A759-6A51-4108-AA02-DFA0A04FC94B}">
-              <ma14:wrappingTextBoxFlag xmlns:ma14="http://schemas.microsoft.com/office/mac/drawingml/2011/main" xmlns="" val="1"/>
+              <ma14:wrappingTextBoxFlag xmlns="" xmlns:ma14="http://schemas.microsoft.com/office/mac/drawingml/2011/main" val="1"/>
             </a:ext>
           </a:extLst>
         </p:spPr>
@@ -15424,7 +15101,7 @@
           </a:ln>
           <a:extLst>
             <a:ext uri="{C572A759-6A51-4108-AA02-DFA0A04FC94B}">
-              <ma14:wrappingTextBoxFlag xmlns:ma14="http://schemas.microsoft.com/office/mac/drawingml/2011/main" xmlns="" val="1"/>
+              <ma14:wrappingTextBoxFlag xmlns="" xmlns:ma14="http://schemas.microsoft.com/office/mac/drawingml/2011/main" val="1"/>
             </a:ext>
           </a:extLst>
         </p:spPr>
@@ -15628,7 +15305,7 @@
           </a:ln>
           <a:extLst>
             <a:ext uri="{C572A759-6A51-4108-AA02-DFA0A04FC94B}">
-              <ma14:wrappingTextBoxFlag xmlns:ma14="http://schemas.microsoft.com/office/mac/drawingml/2011/main" xmlns="" val="1"/>
+              <ma14:wrappingTextBoxFlag xmlns="" xmlns:ma14="http://schemas.microsoft.com/office/mac/drawingml/2011/main" val="1"/>
             </a:ext>
           </a:extLst>
         </p:spPr>
@@ -15720,7 +15397,7 @@
           </a:ln>
           <a:extLst>
             <a:ext uri="{C572A759-6A51-4108-AA02-DFA0A04FC94B}">
-              <ma14:wrappingTextBoxFlag xmlns:ma14="http://schemas.microsoft.com/office/mac/drawingml/2011/main" xmlns="" val="1"/>
+              <ma14:wrappingTextBoxFlag xmlns="" xmlns:ma14="http://schemas.microsoft.com/office/mac/drawingml/2011/main" val="1"/>
             </a:ext>
           </a:extLst>
         </p:spPr>
@@ -15916,7 +15593,7 @@
           </a:ln>
           <a:extLst>
             <a:ext uri="{C572A759-6A51-4108-AA02-DFA0A04FC94B}">
-              <ma14:wrappingTextBoxFlag xmlns:ma14="http://schemas.microsoft.com/office/mac/drawingml/2011/main" xmlns="" val="1"/>
+              <ma14:wrappingTextBoxFlag xmlns="" xmlns:ma14="http://schemas.microsoft.com/office/mac/drawingml/2011/main" val="1"/>
             </a:ext>
           </a:extLst>
         </p:spPr>
@@ -16037,7 +15714,7 @@
           </a:ln>
           <a:extLst>
             <a:ext uri="{C572A759-6A51-4108-AA02-DFA0A04FC94B}">
-              <ma14:wrappingTextBoxFlag xmlns:ma14="http://schemas.microsoft.com/office/mac/drawingml/2011/main" xmlns="" val="1"/>
+              <ma14:wrappingTextBoxFlag xmlns="" xmlns:ma14="http://schemas.microsoft.com/office/mac/drawingml/2011/main" val="1"/>
             </a:ext>
           </a:extLst>
         </p:spPr>
@@ -16134,7 +15811,7 @@
           </a:ln>
           <a:extLst>
             <a:ext uri="{C572A759-6A51-4108-AA02-DFA0A04FC94B}">
-              <ma14:wrappingTextBoxFlag xmlns:ma14="http://schemas.microsoft.com/office/mac/drawingml/2011/main" xmlns="" val="1"/>
+              <ma14:wrappingTextBoxFlag xmlns="" xmlns:ma14="http://schemas.microsoft.com/office/mac/drawingml/2011/main" val="1"/>
             </a:ext>
           </a:extLst>
         </p:spPr>
@@ -16243,7 +15920,7 @@
           </a:ln>
           <a:extLst>
             <a:ext uri="{C572A759-6A51-4108-AA02-DFA0A04FC94B}">
-              <ma14:wrappingTextBoxFlag xmlns:ma14="http://schemas.microsoft.com/office/mac/drawingml/2011/main" xmlns="" val="1"/>
+              <ma14:wrappingTextBoxFlag xmlns="" xmlns:ma14="http://schemas.microsoft.com/office/mac/drawingml/2011/main" val="1"/>
             </a:ext>
           </a:extLst>
         </p:spPr>
@@ -16297,7 +15974,7 @@
           </a:ln>
           <a:extLst>
             <a:ext uri="{C572A759-6A51-4108-AA02-DFA0A04FC94B}">
-              <ma14:wrappingTextBoxFlag xmlns:ma14="http://schemas.microsoft.com/office/mac/drawingml/2011/main" xmlns="" val="1"/>
+              <ma14:wrappingTextBoxFlag xmlns="" xmlns:ma14="http://schemas.microsoft.com/office/mac/drawingml/2011/main" val="1"/>
             </a:ext>
           </a:extLst>
         </p:spPr>
@@ -16547,7 +16224,7 @@
           </a:ln>
           <a:extLst>
             <a:ext uri="{C572A759-6A51-4108-AA02-DFA0A04FC94B}">
-              <ma14:wrappingTextBoxFlag xmlns:ma14="http://schemas.microsoft.com/office/mac/drawingml/2011/main" xmlns="" val="1"/>
+              <ma14:wrappingTextBoxFlag xmlns="" xmlns:ma14="http://schemas.microsoft.com/office/mac/drawingml/2011/main" val="1"/>
             </a:ext>
           </a:extLst>
         </p:spPr>
@@ -16656,7 +16333,7 @@
           </a:ln>
           <a:extLst>
             <a:ext uri="{C572A759-6A51-4108-AA02-DFA0A04FC94B}">
-              <ma14:wrappingTextBoxFlag xmlns:ma14="http://schemas.microsoft.com/office/mac/drawingml/2011/main" xmlns="" val="1"/>
+              <ma14:wrappingTextBoxFlag xmlns="" xmlns:ma14="http://schemas.microsoft.com/office/mac/drawingml/2011/main" val="1"/>
             </a:ext>
           </a:extLst>
         </p:spPr>
@@ -16703,7 +16380,7 @@
           </a:ln>
           <a:extLst>
             <a:ext uri="{C572A759-6A51-4108-AA02-DFA0A04FC94B}">
-              <ma14:wrappingTextBoxFlag xmlns:ma14="http://schemas.microsoft.com/office/mac/drawingml/2011/main" xmlns="" val="1"/>
+              <ma14:wrappingTextBoxFlag xmlns="" xmlns:ma14="http://schemas.microsoft.com/office/mac/drawingml/2011/main" val="1"/>
             </a:ext>
           </a:extLst>
         </p:spPr>
@@ -16795,7 +16472,7 @@
           </a:ln>
           <a:extLst>
             <a:ext uri="{C572A759-6A51-4108-AA02-DFA0A04FC94B}">
-              <ma14:wrappingTextBoxFlag xmlns:ma14="http://schemas.microsoft.com/office/mac/drawingml/2011/main" xmlns="" val="1"/>
+              <ma14:wrappingTextBoxFlag xmlns="" xmlns:ma14="http://schemas.microsoft.com/office/mac/drawingml/2011/main" val="1"/>
             </a:ext>
           </a:extLst>
         </p:spPr>
@@ -16904,7 +16581,7 @@
           </a:ln>
           <a:extLst>
             <a:ext uri="{C572A759-6A51-4108-AA02-DFA0A04FC94B}">
-              <ma14:wrappingTextBoxFlag xmlns:ma14="http://schemas.microsoft.com/office/mac/drawingml/2011/main" xmlns="" val="1"/>
+              <ma14:wrappingTextBoxFlag xmlns="" xmlns:ma14="http://schemas.microsoft.com/office/mac/drawingml/2011/main" val="1"/>
             </a:ext>
           </a:extLst>
         </p:spPr>
@@ -16951,7 +16628,7 @@
           </a:ln>
           <a:extLst>
             <a:ext uri="{C572A759-6A51-4108-AA02-DFA0A04FC94B}">
-              <ma14:wrappingTextBoxFlag xmlns:ma14="http://schemas.microsoft.com/office/mac/drawingml/2011/main" xmlns="" val="1"/>
+              <ma14:wrappingTextBoxFlag xmlns="" xmlns:ma14="http://schemas.microsoft.com/office/mac/drawingml/2011/main" val="1"/>
             </a:ext>
           </a:extLst>
         </p:spPr>
@@ -17043,7 +16720,7 @@
           </a:ln>
           <a:extLst>
             <a:ext uri="{C572A759-6A51-4108-AA02-DFA0A04FC94B}">
-              <ma14:wrappingTextBoxFlag xmlns:ma14="http://schemas.microsoft.com/office/mac/drawingml/2011/main" xmlns="" val="1"/>
+              <ma14:wrappingTextBoxFlag xmlns="" xmlns:ma14="http://schemas.microsoft.com/office/mac/drawingml/2011/main" val="1"/>
             </a:ext>
           </a:extLst>
         </p:spPr>
@@ -17135,7 +16812,7 @@
           </a:ln>
           <a:extLst>
             <a:ext uri="{C572A759-6A51-4108-AA02-DFA0A04FC94B}">
-              <ma14:wrappingTextBoxFlag xmlns:ma14="http://schemas.microsoft.com/office/mac/drawingml/2011/main" xmlns="" val="1"/>
+              <ma14:wrappingTextBoxFlag xmlns="" xmlns:ma14="http://schemas.microsoft.com/office/mac/drawingml/2011/main" val="1"/>
             </a:ext>
           </a:extLst>
         </p:spPr>
@@ -17490,100 +17167,6 @@
         </a:graphic>
       </p:graphicFrame>
     </p:spTree>
-  </p:cSld>
-  <p:clrMapOvr>
-    <a:masterClrMapping/>
-  </p:clrMapOvr>
-  <p:transition spd="med"/>
-</p:sld>
-</file>
-
-<file path=ppt/slides/slide70.xml><?xml version="1.0" encoding="utf-8"?>
-<p:sld xmlns:a="http://schemas.openxmlformats.org/drawingml/2006/main" xmlns:r="http://schemas.openxmlformats.org/officeDocument/2006/relationships" xmlns:p="http://schemas.openxmlformats.org/presentationml/2006/main">
-  <p:cSld>
-    <p:spTree>
-      <p:nvGrpSpPr>
-        <p:cNvPr id="1" name=""/>
-        <p:cNvGrpSpPr/>
-        <p:nvPr/>
-      </p:nvGrpSpPr>
-      <p:grpSpPr>
-        <a:xfrm>
-          <a:off x="0" y="0"/>
-          <a:ext cx="0" cy="0"/>
-          <a:chOff x="0" y="0"/>
-          <a:chExt cx="0" cy="0"/>
-        </a:xfrm>
-      </p:grpSpPr>
-      <p:sp>
-        <p:nvSpPr>
-          <p:cNvPr id="9" name="Text Placeholder 8">
-            <a:extLst>
-              <a:ext uri="{FF2B5EF4-FFF2-40B4-BE49-F238E27FC236}">
-                <a16:creationId xmlns:a16="http://schemas.microsoft.com/office/drawing/2014/main" id="{9127305D-ABDC-46F2-9BB8-4EDEC0FF1639}"/>
-              </a:ext>
-            </a:extLst>
-          </p:cNvPr>
-          <p:cNvSpPr>
-            <a:spLocks noGrp="1"/>
-          </p:cNvSpPr>
-          <p:nvPr>
-            <p:ph type="body" sz="quarter" idx="1"/>
-          </p:nvPr>
-        </p:nvSpPr>
-        <p:spPr/>
-        <p:txBody>
-          <a:bodyPr>
-            <a:normAutofit fontScale="92500" lnSpcReduction="20000"/>
-          </a:bodyPr>
-          <a:lstStyle/>
-          <a:p>
-            <a:r>
-              <a:rPr lang="en-US" sz="17000" dirty="0"/>
-              <a:t>Evaluations</a:t>
-            </a:r>
-          </a:p>
-        </p:txBody>
-      </p:sp>
-      <p:sp>
-        <p:nvSpPr>
-          <p:cNvPr id="10" name="Text Placeholder 9">
-            <a:extLst>
-              <a:ext uri="{FF2B5EF4-FFF2-40B4-BE49-F238E27FC236}">
-                <a16:creationId xmlns:a16="http://schemas.microsoft.com/office/drawing/2014/main" id="{84913EF7-43F7-4FF6-BDD7-974059552F7B}"/>
-              </a:ext>
-            </a:extLst>
-          </p:cNvPr>
-          <p:cNvSpPr>
-            <a:spLocks noGrp="1"/>
-          </p:cNvSpPr>
-          <p:nvPr>
-            <p:ph type="body" sz="quarter" idx="10"/>
-          </p:nvPr>
-        </p:nvSpPr>
-        <p:spPr/>
-        <p:txBody>
-          <a:bodyPr>
-            <a:normAutofit fontScale="40000" lnSpcReduction="20000"/>
-          </a:bodyPr>
-          <a:lstStyle/>
-          <a:p>
-            <a:r>
-              <a:rPr lang="en-US" dirty="0">
-                <a:hlinkClick r:id="rId2"/>
-              </a:rPr>
-              <a:t>https://www.careercenters.com/evaluations/new</a:t>
-            </a:r>
-            <a:endParaRPr lang="en-US" dirty="0"/>
-          </a:p>
-        </p:txBody>
-      </p:sp>
-    </p:spTree>
-    <p:extLst>
-      <p:ext uri="{BB962C8B-B14F-4D97-AF65-F5344CB8AC3E}">
-        <p14:creationId xmlns:p14="http://schemas.microsoft.com/office/powerpoint/2010/main" val="2647350311"/>
-      </p:ext>
-    </p:extLst>
   </p:cSld>
   <p:clrMapOvr>
     <a:masterClrMapping/>

</xml_diff>

<commit_message>
update session 1 slide
</commit_message>
<xml_diff>
--- a/Session01/Session1_Slides.pptx
+++ b/Session01/Session1_Slides.pptx
@@ -5422,7 +5422,7 @@
           </a:ln>
           <a:extLst>
             <a:ext uri="{C572A759-6A51-4108-AA02-DFA0A04FC94B}">
-              <ma14:wrappingTextBoxFlag xmlns="" xmlns:ma14="http://schemas.microsoft.com/office/mac/drawingml/2011/main" val="1"/>
+              <ma14:wrappingTextBoxFlag xmlns:ma14="http://schemas.microsoft.com/office/mac/drawingml/2011/main" xmlns="" val="1"/>
             </a:ext>
           </a:extLst>
         </p:spPr>
@@ -5461,7 +5461,7 @@
           </a:ln>
           <a:extLst>
             <a:ext uri="{C572A759-6A51-4108-AA02-DFA0A04FC94B}">
-              <ma14:wrappingTextBoxFlag xmlns="" xmlns:ma14="http://schemas.microsoft.com/office/mac/drawingml/2011/main" val="1"/>
+              <ma14:wrappingTextBoxFlag xmlns:ma14="http://schemas.microsoft.com/office/mac/drawingml/2011/main" xmlns="" val="1"/>
             </a:ext>
           </a:extLst>
         </p:spPr>
@@ -6655,7 +6655,7 @@
           </a:ln>
           <a:extLst>
             <a:ext uri="{C572A759-6A51-4108-AA02-DFA0A04FC94B}">
-              <ma14:wrappingTextBoxFlag xmlns="" xmlns:ma14="http://schemas.microsoft.com/office/mac/drawingml/2011/main" val="1"/>
+              <ma14:wrappingTextBoxFlag xmlns:ma14="http://schemas.microsoft.com/office/mac/drawingml/2011/main" xmlns="" val="1"/>
             </a:ext>
           </a:extLst>
         </p:spPr>
@@ -6704,7 +6704,7 @@
           </a:ln>
           <a:extLst>
             <a:ext uri="{C572A759-6A51-4108-AA02-DFA0A04FC94B}">
-              <ma14:wrappingTextBoxFlag xmlns="" xmlns:ma14="http://schemas.microsoft.com/office/mac/drawingml/2011/main" val="1"/>
+              <ma14:wrappingTextBoxFlag xmlns:ma14="http://schemas.microsoft.com/office/mac/drawingml/2011/main" xmlns="" val="1"/>
             </a:ext>
           </a:extLst>
         </p:spPr>
@@ -6815,7 +6815,7 @@
           </a:ln>
           <a:extLst>
             <a:ext uri="{C572A759-6A51-4108-AA02-DFA0A04FC94B}">
-              <ma14:wrappingTextBoxFlag xmlns="" xmlns:ma14="http://schemas.microsoft.com/office/mac/drawingml/2011/main" val="1"/>
+              <ma14:wrappingTextBoxFlag xmlns:ma14="http://schemas.microsoft.com/office/mac/drawingml/2011/main" xmlns="" val="1"/>
             </a:ext>
           </a:extLst>
         </p:spPr>
@@ -6862,7 +6862,7 @@
           </a:ln>
           <a:extLst>
             <a:ext uri="{C572A759-6A51-4108-AA02-DFA0A04FC94B}">
-              <ma14:wrappingTextBoxFlag xmlns="" xmlns:ma14="http://schemas.microsoft.com/office/mac/drawingml/2011/main" val="1"/>
+              <ma14:wrappingTextBoxFlag xmlns:ma14="http://schemas.microsoft.com/office/mac/drawingml/2011/main" xmlns="" val="1"/>
             </a:ext>
           </a:extLst>
         </p:spPr>
@@ -6963,7 +6963,7 @@
           </a:ln>
           <a:extLst>
             <a:ext uri="{C572A759-6A51-4108-AA02-DFA0A04FC94B}">
-              <ma14:wrappingTextBoxFlag xmlns="" xmlns:ma14="http://schemas.microsoft.com/office/mac/drawingml/2011/main" val="1"/>
+              <ma14:wrappingTextBoxFlag xmlns:ma14="http://schemas.microsoft.com/office/mac/drawingml/2011/main" xmlns="" val="1"/>
             </a:ext>
           </a:extLst>
         </p:spPr>
@@ -7117,7 +7117,7 @@
           </a:ln>
           <a:extLst>
             <a:ext uri="{C572A759-6A51-4108-AA02-DFA0A04FC94B}">
-              <ma14:wrappingTextBoxFlag xmlns="" xmlns:ma14="http://schemas.microsoft.com/office/mac/drawingml/2011/main" val="1"/>
+              <ma14:wrappingTextBoxFlag xmlns:ma14="http://schemas.microsoft.com/office/mac/drawingml/2011/main" xmlns="" val="1"/>
             </a:ext>
           </a:extLst>
         </p:spPr>
@@ -7164,7 +7164,7 @@
           </a:ln>
           <a:extLst>
             <a:ext uri="{C572A759-6A51-4108-AA02-DFA0A04FC94B}">
-              <ma14:wrappingTextBoxFlag xmlns="" xmlns:ma14="http://schemas.microsoft.com/office/mac/drawingml/2011/main" val="1"/>
+              <ma14:wrappingTextBoxFlag xmlns:ma14="http://schemas.microsoft.com/office/mac/drawingml/2011/main" xmlns="" val="1"/>
             </a:ext>
           </a:extLst>
         </p:spPr>
@@ -7256,7 +7256,7 @@
           </a:ln>
           <a:extLst>
             <a:ext uri="{C572A759-6A51-4108-AA02-DFA0A04FC94B}">
-              <ma14:wrappingTextBoxFlag xmlns="" xmlns:ma14="http://schemas.microsoft.com/office/mac/drawingml/2011/main" val="1"/>
+              <ma14:wrappingTextBoxFlag xmlns:ma14="http://schemas.microsoft.com/office/mac/drawingml/2011/main" xmlns="" val="1"/>
             </a:ext>
           </a:extLst>
         </p:spPr>
@@ -7463,7 +7463,7 @@
           </a:ln>
           <a:extLst>
             <a:ext uri="{C572A759-6A51-4108-AA02-DFA0A04FC94B}">
-              <ma14:wrappingTextBoxFlag xmlns="" xmlns:ma14="http://schemas.microsoft.com/office/mac/drawingml/2011/main" val="1"/>
+              <ma14:wrappingTextBoxFlag xmlns:ma14="http://schemas.microsoft.com/office/mac/drawingml/2011/main" xmlns="" val="1"/>
             </a:ext>
           </a:extLst>
         </p:spPr>
@@ -7572,7 +7572,7 @@
           </a:ln>
           <a:extLst>
             <a:ext uri="{C572A759-6A51-4108-AA02-DFA0A04FC94B}">
-              <ma14:wrappingTextBoxFlag xmlns="" xmlns:ma14="http://schemas.microsoft.com/office/mac/drawingml/2011/main" val="1"/>
+              <ma14:wrappingTextBoxFlag xmlns:ma14="http://schemas.microsoft.com/office/mac/drawingml/2011/main" xmlns="" val="1"/>
             </a:ext>
           </a:extLst>
         </p:spPr>
@@ -7765,7 +7765,7 @@
           </a:ln>
           <a:extLst>
             <a:ext uri="{C572A759-6A51-4108-AA02-DFA0A04FC94B}">
-              <ma14:wrappingTextBoxFlag xmlns="" xmlns:ma14="http://schemas.microsoft.com/office/mac/drawingml/2011/main" val="1"/>
+              <ma14:wrappingTextBoxFlag xmlns:ma14="http://schemas.microsoft.com/office/mac/drawingml/2011/main" xmlns="" val="1"/>
             </a:ext>
           </a:extLst>
         </p:spPr>
@@ -7896,7 +7896,7 @@
           </a:ln>
           <a:extLst>
             <a:ext uri="{C572A759-6A51-4108-AA02-DFA0A04FC94B}">
-              <ma14:wrappingTextBoxFlag xmlns="" xmlns:ma14="http://schemas.microsoft.com/office/mac/drawingml/2011/main" val="1"/>
+              <ma14:wrappingTextBoxFlag xmlns:ma14="http://schemas.microsoft.com/office/mac/drawingml/2011/main" xmlns="" val="1"/>
             </a:ext>
           </a:extLst>
         </p:spPr>
@@ -8005,7 +8005,7 @@
           </a:ln>
           <a:extLst>
             <a:ext uri="{C572A759-6A51-4108-AA02-DFA0A04FC94B}">
-              <ma14:wrappingTextBoxFlag xmlns="" xmlns:ma14="http://schemas.microsoft.com/office/mac/drawingml/2011/main" val="1"/>
+              <ma14:wrappingTextBoxFlag xmlns:ma14="http://schemas.microsoft.com/office/mac/drawingml/2011/main" xmlns="" val="1"/>
             </a:ext>
           </a:extLst>
         </p:spPr>
@@ -8136,7 +8136,7 @@
           </a:ln>
           <a:extLst>
             <a:ext uri="{C572A759-6A51-4108-AA02-DFA0A04FC94B}">
-              <ma14:wrappingTextBoxFlag xmlns="" xmlns:ma14="http://schemas.microsoft.com/office/mac/drawingml/2011/main" val="1"/>
+              <ma14:wrappingTextBoxFlag xmlns:ma14="http://schemas.microsoft.com/office/mac/drawingml/2011/main" xmlns="" val="1"/>
             </a:ext>
           </a:extLst>
         </p:spPr>
@@ -8441,7 +8441,7 @@
           </a:ln>
           <a:extLst>
             <a:ext uri="{C572A759-6A51-4108-AA02-DFA0A04FC94B}">
-              <ma14:wrappingTextBoxFlag xmlns="" xmlns:ma14="http://schemas.microsoft.com/office/mac/drawingml/2011/main" val="1"/>
+              <ma14:wrappingTextBoxFlag xmlns:ma14="http://schemas.microsoft.com/office/mac/drawingml/2011/main" xmlns="" val="1"/>
             </a:ext>
           </a:extLst>
         </p:spPr>
@@ -8572,7 +8572,7 @@
           </a:ln>
           <a:extLst>
             <a:ext uri="{C572A759-6A51-4108-AA02-DFA0A04FC94B}">
-              <ma14:wrappingTextBoxFlag xmlns="" xmlns:ma14="http://schemas.microsoft.com/office/mac/drawingml/2011/main" val="1"/>
+              <ma14:wrappingTextBoxFlag xmlns:ma14="http://schemas.microsoft.com/office/mac/drawingml/2011/main" xmlns="" val="1"/>
             </a:ext>
           </a:extLst>
         </p:spPr>
@@ -8703,7 +8703,7 @@
           </a:ln>
           <a:extLst>
             <a:ext uri="{C572A759-6A51-4108-AA02-DFA0A04FC94B}">
-              <ma14:wrappingTextBoxFlag xmlns="" xmlns:ma14="http://schemas.microsoft.com/office/mac/drawingml/2011/main" val="1"/>
+              <ma14:wrappingTextBoxFlag xmlns:ma14="http://schemas.microsoft.com/office/mac/drawingml/2011/main" xmlns="" val="1"/>
             </a:ext>
           </a:extLst>
         </p:spPr>
@@ -8812,7 +8812,7 @@
           </a:ln>
           <a:extLst>
             <a:ext uri="{C572A759-6A51-4108-AA02-DFA0A04FC94B}">
-              <ma14:wrappingTextBoxFlag xmlns="" xmlns:ma14="http://schemas.microsoft.com/office/mac/drawingml/2011/main" val="1"/>
+              <ma14:wrappingTextBoxFlag xmlns:ma14="http://schemas.microsoft.com/office/mac/drawingml/2011/main" xmlns="" val="1"/>
             </a:ext>
           </a:extLst>
         </p:spPr>
@@ -8943,7 +8943,7 @@
           </a:ln>
           <a:extLst>
             <a:ext uri="{C572A759-6A51-4108-AA02-DFA0A04FC94B}">
-              <ma14:wrappingTextBoxFlag xmlns="" xmlns:ma14="http://schemas.microsoft.com/office/mac/drawingml/2011/main" val="1"/>
+              <ma14:wrappingTextBoxFlag xmlns:ma14="http://schemas.microsoft.com/office/mac/drawingml/2011/main" xmlns="" val="1"/>
             </a:ext>
           </a:extLst>
         </p:spPr>
@@ -9074,7 +9074,7 @@
           </a:ln>
           <a:extLst>
             <a:ext uri="{C572A759-6A51-4108-AA02-DFA0A04FC94B}">
-              <ma14:wrappingTextBoxFlag xmlns="" xmlns:ma14="http://schemas.microsoft.com/office/mac/drawingml/2011/main" val="1"/>
+              <ma14:wrappingTextBoxFlag xmlns:ma14="http://schemas.microsoft.com/office/mac/drawingml/2011/main" xmlns="" val="1"/>
             </a:ext>
           </a:extLst>
         </p:spPr>
@@ -10669,7 +10669,7 @@
           </a:ln>
           <a:extLst>
             <a:ext uri="{C572A759-6A51-4108-AA02-DFA0A04FC94B}">
-              <ma14:wrappingTextBoxFlag xmlns="" xmlns:ma14="http://schemas.microsoft.com/office/mac/drawingml/2011/main" val="1"/>
+              <ma14:wrappingTextBoxFlag xmlns:ma14="http://schemas.microsoft.com/office/mac/drawingml/2011/main" xmlns="" val="1"/>
             </a:ext>
           </a:extLst>
         </p:spPr>
@@ -10778,7 +10778,7 @@
           </a:ln>
           <a:extLst>
             <a:ext uri="{C572A759-6A51-4108-AA02-DFA0A04FC94B}">
-              <ma14:wrappingTextBoxFlag xmlns="" xmlns:ma14="http://schemas.microsoft.com/office/mac/drawingml/2011/main" val="1"/>
+              <ma14:wrappingTextBoxFlag xmlns:ma14="http://schemas.microsoft.com/office/mac/drawingml/2011/main" xmlns="" val="1"/>
             </a:ext>
           </a:extLst>
         </p:spPr>
@@ -10870,7 +10870,7 @@
           </a:ln>
           <a:extLst>
             <a:ext uri="{C572A759-6A51-4108-AA02-DFA0A04FC94B}">
-              <ma14:wrappingTextBoxFlag xmlns="" xmlns:ma14="http://schemas.microsoft.com/office/mac/drawingml/2011/main" val="1"/>
+              <ma14:wrappingTextBoxFlag xmlns:ma14="http://schemas.microsoft.com/office/mac/drawingml/2011/main" xmlns="" val="1"/>
             </a:ext>
           </a:extLst>
         </p:spPr>
@@ -11113,7 +11113,7 @@
           </a:ln>
           <a:extLst>
             <a:ext uri="{C572A759-6A51-4108-AA02-DFA0A04FC94B}">
-              <ma14:wrappingTextBoxFlag xmlns="" xmlns:ma14="http://schemas.microsoft.com/office/mac/drawingml/2011/main" val="1"/>
+              <ma14:wrappingTextBoxFlag xmlns:ma14="http://schemas.microsoft.com/office/mac/drawingml/2011/main" xmlns="" val="1"/>
             </a:ext>
           </a:extLst>
         </p:spPr>
@@ -11239,7 +11239,7 @@
           </a:ln>
           <a:extLst>
             <a:ext uri="{C572A759-6A51-4108-AA02-DFA0A04FC94B}">
-              <ma14:wrappingTextBoxFlag xmlns="" xmlns:ma14="http://schemas.microsoft.com/office/mac/drawingml/2011/main" val="1"/>
+              <ma14:wrappingTextBoxFlag xmlns:ma14="http://schemas.microsoft.com/office/mac/drawingml/2011/main" xmlns="" val="1"/>
             </a:ext>
           </a:extLst>
         </p:spPr>
@@ -11286,7 +11286,7 @@
           </a:ln>
           <a:extLst>
             <a:ext uri="{C572A759-6A51-4108-AA02-DFA0A04FC94B}">
-              <ma14:wrappingTextBoxFlag xmlns="" xmlns:ma14="http://schemas.microsoft.com/office/mac/drawingml/2011/main" val="1"/>
+              <ma14:wrappingTextBoxFlag xmlns:ma14="http://schemas.microsoft.com/office/mac/drawingml/2011/main" xmlns="" val="1"/>
             </a:ext>
           </a:extLst>
         </p:spPr>
@@ -11413,7 +11413,7 @@
           </a:ln>
           <a:extLst>
             <a:ext uri="{C572A759-6A51-4108-AA02-DFA0A04FC94B}">
-              <ma14:wrappingTextBoxFlag xmlns="" xmlns:ma14="http://schemas.microsoft.com/office/mac/drawingml/2011/main" val="1"/>
+              <ma14:wrappingTextBoxFlag xmlns:ma14="http://schemas.microsoft.com/office/mac/drawingml/2011/main" xmlns="" val="1"/>
             </a:ext>
           </a:extLst>
         </p:spPr>
@@ -11684,7 +11684,7 @@
           </a:ln>
           <a:extLst>
             <a:ext uri="{C572A759-6A51-4108-AA02-DFA0A04FC94B}">
-              <ma14:wrappingTextBoxFlag xmlns="" xmlns:ma14="http://schemas.microsoft.com/office/mac/drawingml/2011/main" val="1"/>
+              <ma14:wrappingTextBoxFlag xmlns:ma14="http://schemas.microsoft.com/office/mac/drawingml/2011/main" xmlns="" val="1"/>
             </a:ext>
           </a:extLst>
         </p:spPr>
@@ -11731,7 +11731,7 @@
           </a:ln>
           <a:extLst>
             <a:ext uri="{C572A759-6A51-4108-AA02-DFA0A04FC94B}">
-              <ma14:wrappingTextBoxFlag xmlns="" xmlns:ma14="http://schemas.microsoft.com/office/mac/drawingml/2011/main" val="1"/>
+              <ma14:wrappingTextBoxFlag xmlns:ma14="http://schemas.microsoft.com/office/mac/drawingml/2011/main" xmlns="" val="1"/>
             </a:ext>
           </a:extLst>
         </p:spPr>
@@ -11858,7 +11858,7 @@
           </a:ln>
           <a:extLst>
             <a:ext uri="{C572A759-6A51-4108-AA02-DFA0A04FC94B}">
-              <ma14:wrappingTextBoxFlag xmlns="" xmlns:ma14="http://schemas.microsoft.com/office/mac/drawingml/2011/main" val="1"/>
+              <ma14:wrappingTextBoxFlag xmlns:ma14="http://schemas.microsoft.com/office/mac/drawingml/2011/main" xmlns="" val="1"/>
             </a:ext>
           </a:extLst>
         </p:spPr>
@@ -11940,16 +11940,14 @@
           </p:nvPr>
         </p:nvSpPr>
         <p:spPr>
-          <a:xfrm>
-            <a:off x="406400" y="1536700"/>
-            <a:ext cx="12192000" cy="1169261"/>
-          </a:xfrm>
-          <a:prstGeom prst="rect">
-            <a:avLst/>
-          </a:prstGeom>
-        </p:spPr>
-        <p:txBody>
-          <a:bodyPr/>
+          <a:prstGeom prst="rect">
+            <a:avLst/>
+          </a:prstGeom>
+        </p:spPr>
+        <p:txBody>
+          <a:bodyPr>
+            <a:normAutofit fontScale="90000"/>
+          </a:bodyPr>
           <a:lstStyle>
             <a:lvl1pPr defTabSz="403097">
               <a:spcBef>
@@ -11967,14 +11965,146 @@
       </p:sp>
       <p:sp>
         <p:nvSpPr>
-          <p:cNvPr id="398" name="Shape 398"/>
+          <p:cNvPr id="2" name="Text Placeholder 1">
+            <a:extLst>
+              <a:ext uri="{FF2B5EF4-FFF2-40B4-BE49-F238E27FC236}">
+                <a16:creationId xmlns:a16="http://schemas.microsoft.com/office/drawing/2014/main" id="{22080EE7-8D87-C87B-3333-4CBAC9FBC15C}"/>
+              </a:ext>
+            </a:extLst>
+          </p:cNvPr>
+          <p:cNvSpPr>
+            <a:spLocks noGrp="1"/>
+          </p:cNvSpPr>
+          <p:nvPr>
+            <p:ph type="body" sz="quarter" idx="10"/>
+          </p:nvPr>
+        </p:nvSpPr>
+        <p:spPr/>
+        <p:txBody>
+          <a:bodyPr/>
+          <a:lstStyle/>
+          <a:p>
+            <a:pPr marL="0" indent="0">
+              <a:spcBef>
+                <a:spcPts val="2800"/>
+              </a:spcBef>
+              <a:buNone/>
+            </a:pPr>
+            <a:r>
+              <a:rPr lang="en-US" i="0" dirty="0"/>
+              <a:t>English:</a:t>
+            </a:r>
+          </a:p>
+          <a:p>
+            <a:pPr marL="272821" lvl="1" indent="0">
+              <a:spcBef>
+                <a:spcPts val="2800"/>
+              </a:spcBef>
+              <a:buNone/>
+            </a:pPr>
+            <a:r>
+              <a:rPr lang="en-US" i="0" dirty="0"/>
+              <a:t>get the </a:t>
+            </a:r>
+            <a:r>
+              <a:rPr lang="en-US" i="0" dirty="0">
+                <a:solidFill>
+                  <a:srgbClr val="00B050"/>
+                </a:solidFill>
+              </a:rPr>
+              <a:t>third</a:t>
+            </a:r>
+            <a:r>
+              <a:rPr lang="en-US" i="0" dirty="0"/>
+              <a:t> to the </a:t>
+            </a:r>
+            <a:r>
+              <a:rPr lang="en-US" i="0" dirty="0">
+                <a:solidFill>
+                  <a:srgbClr val="00B050"/>
+                </a:solidFill>
+              </a:rPr>
+              <a:t>eleventh</a:t>
+            </a:r>
+            <a:r>
+              <a:rPr lang="en-US" i="0" dirty="0"/>
+              <a:t> elements of </a:t>
+            </a:r>
+            <a:r>
+              <a:rPr lang="en-US" i="0" dirty="0" err="1"/>
+              <a:t>my_string</a:t>
+            </a:r>
+            <a:endParaRPr lang="en-US" i="0" dirty="0"/>
+          </a:p>
+          <a:p>
+            <a:pPr marL="272821" lvl="1" indent="0">
+              <a:spcBef>
+                <a:spcPts val="2800"/>
+              </a:spcBef>
+              <a:buNone/>
+            </a:pPr>
+            <a:r>
+              <a:rPr lang="en-US" i="0" dirty="0"/>
+              <a:t>	or in other words</a:t>
+            </a:r>
+          </a:p>
+          <a:p>
+            <a:pPr marL="272821" lvl="1" indent="0">
+              <a:spcBef>
+                <a:spcPts val="2800"/>
+              </a:spcBef>
+              <a:buNone/>
+            </a:pPr>
+            <a:r>
+              <a:rPr lang="en-US" i="0" dirty="0"/>
+              <a:t>get the </a:t>
+            </a:r>
+            <a:r>
+              <a:rPr lang="en-US" i="0" dirty="0">
+                <a:solidFill>
+                  <a:srgbClr val="00B050"/>
+                </a:solidFill>
+              </a:rPr>
+              <a:t>fourth</a:t>
+            </a:r>
+            <a:r>
+              <a:rPr lang="en-US" i="0" dirty="0"/>
+              <a:t> letter to the </a:t>
+            </a:r>
+            <a:r>
+              <a:rPr lang="en-US" i="0" dirty="0">
+                <a:solidFill>
+                  <a:srgbClr val="00B050"/>
+                </a:solidFill>
+              </a:rPr>
+              <a:t>twelfth</a:t>
+            </a:r>
+            <a:r>
+              <a:rPr lang="en-US" i="0" dirty="0"/>
+              <a:t> letter</a:t>
+            </a:r>
+          </a:p>
+          <a:p>
+            <a:pPr marL="0" indent="0">
+              <a:spcBef>
+                <a:spcPts val="2800"/>
+              </a:spcBef>
+              <a:buNone/>
+            </a:pPr>
+            <a:endParaRPr lang="en-US" dirty="0"/>
+          </a:p>
+        </p:txBody>
+      </p:sp>
+      <p:sp>
+        <p:nvSpPr>
+          <p:cNvPr id="399" name="Shape 399"/>
           <p:cNvSpPr/>
           <p:nvPr/>
         </p:nvSpPr>
         <p:spPr>
           <a:xfrm>
-            <a:off x="439080" y="4072619"/>
-            <a:ext cx="2606499" cy="1041401"/>
+            <a:off x="519909" y="5322061"/>
+            <a:ext cx="12484891" cy="964367"/>
           </a:xfrm>
           <a:prstGeom prst="rect">
             <a:avLst/>
@@ -11984,54 +12114,7 @@
           </a:ln>
           <a:extLst>
             <a:ext uri="{C572A759-6A51-4108-AA02-DFA0A04FC94B}">
-              <ma14:wrappingTextBoxFlag xmlns="" xmlns:ma14="http://schemas.microsoft.com/office/mac/drawingml/2011/main" val="1"/>
-            </a:ext>
-          </a:extLst>
-        </p:spPr>
-        <p:txBody>
-          <a:bodyPr wrap="none" lIns="50800" tIns="50800" rIns="50800" bIns="50800" anchor="ctr">
-            <a:spAutoFit/>
-          </a:bodyPr>
-          <a:lstStyle>
-            <a:lvl1pPr>
-              <a:defRPr sz="5400">
-                <a:solidFill>
-                  <a:srgbClr val="838787"/>
-                </a:solidFill>
-                <a:latin typeface="Avenir Next"/>
-                <a:ea typeface="Avenir Next"/>
-                <a:cs typeface="Avenir Next"/>
-                <a:sym typeface="Avenir Next"/>
-              </a:defRPr>
-            </a:lvl1pPr>
-          </a:lstStyle>
-          <a:p>
-            <a:r>
-              <a:t>English:</a:t>
-            </a:r>
-          </a:p>
-        </p:txBody>
-      </p:sp>
-      <p:sp>
-        <p:nvSpPr>
-          <p:cNvPr id="399" name="Shape 399"/>
-          <p:cNvSpPr/>
-          <p:nvPr/>
-        </p:nvSpPr>
-        <p:spPr>
-          <a:xfrm>
-            <a:off x="513295" y="5102496"/>
-            <a:ext cx="12484891" cy="1826141"/>
-          </a:xfrm>
-          <a:prstGeom prst="rect">
-            <a:avLst/>
-          </a:prstGeom>
-          <a:ln w="12700">
-            <a:miter lim="400000"/>
-          </a:ln>
-          <a:extLst>
-            <a:ext uri="{C572A759-6A51-4108-AA02-DFA0A04FC94B}">
-              <ma14:wrappingTextBoxFlag xmlns="" xmlns:ma14="http://schemas.microsoft.com/office/mac/drawingml/2011/main" val="1"/>
+              <ma14:wrappingTextBoxFlag xmlns:ma14="http://schemas.microsoft.com/office/mac/drawingml/2011/main" xmlns="" val="1"/>
             </a:ext>
           </a:extLst>
         </p:spPr>
@@ -12053,43 +12136,7 @@
             </a:lvl1pPr>
           </a:lstStyle>
           <a:p>
-            <a:r>
-              <a:rPr dirty="0"/>
-              <a:t>get the </a:t>
-            </a:r>
-            <a:r>
-              <a:rPr lang="en-US" dirty="0">
-                <a:solidFill>
-                  <a:srgbClr val="00B050"/>
-                </a:solidFill>
-              </a:rPr>
-              <a:t>third</a:t>
-            </a:r>
-            <a:r>
-              <a:rPr lang="en-US" dirty="0"/>
-              <a:t> to the </a:t>
-            </a:r>
-            <a:r>
-              <a:rPr lang="en-US" dirty="0">
-                <a:solidFill>
-                  <a:srgbClr val="00B050"/>
-                </a:solidFill>
-              </a:rPr>
-              <a:t>twelfth</a:t>
-            </a:r>
-            <a:r>
-              <a:rPr lang="en-US" dirty="0"/>
-              <a:t> elements</a:t>
-            </a:r>
-            <a:r>
-              <a:rPr dirty="0"/>
-              <a:t> of </a:t>
-            </a:r>
-            <a:r>
-              <a:rPr dirty="0" err="1"/>
-              <a:t>my_string</a:t>
-            </a:r>
-            <a:endParaRPr dirty="0"/>
+            <a:endParaRPr i="0" dirty="0"/>
           </a:p>
         </p:txBody>
       </p:sp>
@@ -12404,7 +12451,7 @@
           </a:ln>
           <a:extLst>
             <a:ext uri="{C572A759-6A51-4108-AA02-DFA0A04FC94B}">
-              <ma14:wrappingTextBoxFlag xmlns="" xmlns:ma14="http://schemas.microsoft.com/office/mac/drawingml/2011/main" val="1"/>
+              <ma14:wrappingTextBoxFlag xmlns:ma14="http://schemas.microsoft.com/office/mac/drawingml/2011/main" xmlns="" val="1"/>
             </a:ext>
           </a:extLst>
         </p:spPr>
@@ -12513,7 +12560,7 @@
           </a:ln>
           <a:extLst>
             <a:ext uri="{C572A759-6A51-4108-AA02-DFA0A04FC94B}">
-              <ma14:wrappingTextBoxFlag xmlns="" xmlns:ma14="http://schemas.microsoft.com/office/mac/drawingml/2011/main" val="1"/>
+              <ma14:wrappingTextBoxFlag xmlns:ma14="http://schemas.microsoft.com/office/mac/drawingml/2011/main" xmlns="" val="1"/>
             </a:ext>
           </a:extLst>
         </p:spPr>
@@ -12560,7 +12607,7 @@
           </a:ln>
           <a:extLst>
             <a:ext uri="{C572A759-6A51-4108-AA02-DFA0A04FC94B}">
-              <ma14:wrappingTextBoxFlag xmlns="" xmlns:ma14="http://schemas.microsoft.com/office/mac/drawingml/2011/main" val="1"/>
+              <ma14:wrappingTextBoxFlag xmlns:ma14="http://schemas.microsoft.com/office/mac/drawingml/2011/main" xmlns="" val="1"/>
             </a:ext>
           </a:extLst>
         </p:spPr>
@@ -12812,7 +12859,7 @@
           </a:ln>
           <a:extLst>
             <a:ext uri="{C572A759-6A51-4108-AA02-DFA0A04FC94B}">
-              <ma14:wrappingTextBoxFlag xmlns="" xmlns:ma14="http://schemas.microsoft.com/office/mac/drawingml/2011/main" val="1"/>
+              <ma14:wrappingTextBoxFlag xmlns:ma14="http://schemas.microsoft.com/office/mac/drawingml/2011/main" xmlns="" val="1"/>
             </a:ext>
           </a:extLst>
         </p:spPr>
@@ -12859,7 +12906,7 @@
           </a:ln>
           <a:extLst>
             <a:ext uri="{C572A759-6A51-4108-AA02-DFA0A04FC94B}">
-              <ma14:wrappingTextBoxFlag xmlns="" xmlns:ma14="http://schemas.microsoft.com/office/mac/drawingml/2011/main" val="1"/>
+              <ma14:wrappingTextBoxFlag xmlns:ma14="http://schemas.microsoft.com/office/mac/drawingml/2011/main" xmlns="" val="1"/>
             </a:ext>
           </a:extLst>
         </p:spPr>
@@ -12989,7 +13036,7 @@
           </a:ln>
           <a:extLst>
             <a:ext uri="{C572A759-6A51-4108-AA02-DFA0A04FC94B}">
-              <ma14:wrappingTextBoxFlag xmlns="" xmlns:ma14="http://schemas.microsoft.com/office/mac/drawingml/2011/main" val="1"/>
+              <ma14:wrappingTextBoxFlag xmlns:ma14="http://schemas.microsoft.com/office/mac/drawingml/2011/main" xmlns="" val="1"/>
             </a:ext>
           </a:extLst>
         </p:spPr>
@@ -13098,7 +13145,7 @@
           </a:ln>
           <a:extLst>
             <a:ext uri="{C572A759-6A51-4108-AA02-DFA0A04FC94B}">
-              <ma14:wrappingTextBoxFlag xmlns="" xmlns:ma14="http://schemas.microsoft.com/office/mac/drawingml/2011/main" val="1"/>
+              <ma14:wrappingTextBoxFlag xmlns:ma14="http://schemas.microsoft.com/office/mac/drawingml/2011/main" xmlns="" val="1"/>
             </a:ext>
           </a:extLst>
         </p:spPr>
@@ -13217,7 +13264,7 @@
           </a:ln>
           <a:extLst>
             <a:ext uri="{C572A759-6A51-4108-AA02-DFA0A04FC94B}">
-              <ma14:wrappingTextBoxFlag xmlns="" xmlns:ma14="http://schemas.microsoft.com/office/mac/drawingml/2011/main" val="1"/>
+              <ma14:wrappingTextBoxFlag xmlns:ma14="http://schemas.microsoft.com/office/mac/drawingml/2011/main" xmlns="" val="1"/>
             </a:ext>
           </a:extLst>
         </p:spPr>
@@ -13319,7 +13366,7 @@
           </a:ln>
           <a:extLst>
             <a:ext uri="{C572A759-6A51-4108-AA02-DFA0A04FC94B}">
-              <ma14:wrappingTextBoxFlag xmlns="" xmlns:ma14="http://schemas.microsoft.com/office/mac/drawingml/2011/main" val="1"/>
+              <ma14:wrappingTextBoxFlag xmlns:ma14="http://schemas.microsoft.com/office/mac/drawingml/2011/main" xmlns="" val="1"/>
             </a:ext>
           </a:extLst>
         </p:spPr>
@@ -13527,7 +13574,7 @@
           </a:ln>
           <a:extLst>
             <a:ext uri="{C572A759-6A51-4108-AA02-DFA0A04FC94B}">
-              <ma14:wrappingTextBoxFlag xmlns="" xmlns:ma14="http://schemas.microsoft.com/office/mac/drawingml/2011/main" val="1"/>
+              <ma14:wrappingTextBoxFlag xmlns:ma14="http://schemas.microsoft.com/office/mac/drawingml/2011/main" xmlns="" val="1"/>
             </a:ext>
           </a:extLst>
         </p:spPr>
@@ -13640,7 +13687,7 @@
           </a:ln>
           <a:extLst>
             <a:ext uri="{C572A759-6A51-4108-AA02-DFA0A04FC94B}">
-              <ma14:wrappingTextBoxFlag xmlns="" xmlns:ma14="http://schemas.microsoft.com/office/mac/drawingml/2011/main" val="1"/>
+              <ma14:wrappingTextBoxFlag xmlns:ma14="http://schemas.microsoft.com/office/mac/drawingml/2011/main" xmlns="" val="1"/>
             </a:ext>
           </a:extLst>
         </p:spPr>
@@ -13749,7 +13796,7 @@
           </a:ln>
           <a:extLst>
             <a:ext uri="{C572A759-6A51-4108-AA02-DFA0A04FC94B}">
-              <ma14:wrappingTextBoxFlag xmlns="" xmlns:ma14="http://schemas.microsoft.com/office/mac/drawingml/2011/main" val="1"/>
+              <ma14:wrappingTextBoxFlag xmlns:ma14="http://schemas.microsoft.com/office/mac/drawingml/2011/main" xmlns="" val="1"/>
             </a:ext>
           </a:extLst>
         </p:spPr>
@@ -13851,7 +13898,7 @@
           </a:ln>
           <a:extLst>
             <a:ext uri="{C572A759-6A51-4108-AA02-DFA0A04FC94B}">
-              <ma14:wrappingTextBoxFlag xmlns="" xmlns:ma14="http://schemas.microsoft.com/office/mac/drawingml/2011/main" val="1"/>
+              <ma14:wrappingTextBoxFlag xmlns:ma14="http://schemas.microsoft.com/office/mac/drawingml/2011/main" xmlns="" val="1"/>
             </a:ext>
           </a:extLst>
         </p:spPr>
@@ -14100,7 +14147,7 @@
           </a:ln>
           <a:extLst>
             <a:ext uri="{C572A759-6A51-4108-AA02-DFA0A04FC94B}">
-              <ma14:wrappingTextBoxFlag xmlns="" xmlns:ma14="http://schemas.microsoft.com/office/mac/drawingml/2011/main" val="1"/>
+              <ma14:wrappingTextBoxFlag xmlns:ma14="http://schemas.microsoft.com/office/mac/drawingml/2011/main" xmlns="" val="1"/>
             </a:ext>
           </a:extLst>
         </p:spPr>
@@ -14290,7 +14337,7 @@
           </a:ln>
           <a:extLst>
             <a:ext uri="{C572A759-6A51-4108-AA02-DFA0A04FC94B}">
-              <ma14:wrappingTextBoxFlag xmlns="" xmlns:ma14="http://schemas.microsoft.com/office/mac/drawingml/2011/main" val="1"/>
+              <ma14:wrappingTextBoxFlag xmlns:ma14="http://schemas.microsoft.com/office/mac/drawingml/2011/main" xmlns="" val="1"/>
             </a:ext>
           </a:extLst>
         </p:spPr>
@@ -14427,7 +14474,7 @@
           </a:ln>
           <a:extLst>
             <a:ext uri="{C572A759-6A51-4108-AA02-DFA0A04FC94B}">
-              <ma14:wrappingTextBoxFlag xmlns="" xmlns:ma14="http://schemas.microsoft.com/office/mac/drawingml/2011/main" val="1"/>
+              <ma14:wrappingTextBoxFlag xmlns:ma14="http://schemas.microsoft.com/office/mac/drawingml/2011/main" xmlns="" val="1"/>
             </a:ext>
           </a:extLst>
         </p:spPr>
@@ -14633,7 +14680,7 @@
           </a:ln>
           <a:extLst>
             <a:ext uri="{C572A759-6A51-4108-AA02-DFA0A04FC94B}">
-              <ma14:wrappingTextBoxFlag xmlns="" xmlns:ma14="http://schemas.microsoft.com/office/mac/drawingml/2011/main" val="1"/>
+              <ma14:wrappingTextBoxFlag xmlns:ma14="http://schemas.microsoft.com/office/mac/drawingml/2011/main" xmlns="" val="1"/>
             </a:ext>
           </a:extLst>
         </p:spPr>
@@ -14764,7 +14811,7 @@
           </a:ln>
           <a:extLst>
             <a:ext uri="{C572A759-6A51-4108-AA02-DFA0A04FC94B}">
-              <ma14:wrappingTextBoxFlag xmlns="" xmlns:ma14="http://schemas.microsoft.com/office/mac/drawingml/2011/main" val="1"/>
+              <ma14:wrappingTextBoxFlag xmlns:ma14="http://schemas.microsoft.com/office/mac/drawingml/2011/main" xmlns="" val="1"/>
             </a:ext>
           </a:extLst>
         </p:spPr>
@@ -15098,7 +15145,7 @@
           </a:ln>
           <a:extLst>
             <a:ext uri="{C572A759-6A51-4108-AA02-DFA0A04FC94B}">
-              <ma14:wrappingTextBoxFlag xmlns="" xmlns:ma14="http://schemas.microsoft.com/office/mac/drawingml/2011/main" val="1"/>
+              <ma14:wrappingTextBoxFlag xmlns:ma14="http://schemas.microsoft.com/office/mac/drawingml/2011/main" xmlns="" val="1"/>
             </a:ext>
           </a:extLst>
         </p:spPr>
@@ -15207,7 +15254,7 @@
           </a:ln>
           <a:extLst>
             <a:ext uri="{C572A759-6A51-4108-AA02-DFA0A04FC94B}">
-              <ma14:wrappingTextBoxFlag xmlns="" xmlns:ma14="http://schemas.microsoft.com/office/mac/drawingml/2011/main" val="1"/>
+              <ma14:wrappingTextBoxFlag xmlns:ma14="http://schemas.microsoft.com/office/mac/drawingml/2011/main" xmlns="" val="1"/>
             </a:ext>
           </a:extLst>
         </p:spPr>
@@ -15427,7 +15474,7 @@
           </a:ln>
           <a:extLst>
             <a:ext uri="{C572A759-6A51-4108-AA02-DFA0A04FC94B}">
-              <ma14:wrappingTextBoxFlag xmlns="" xmlns:ma14="http://schemas.microsoft.com/office/mac/drawingml/2011/main" val="1"/>
+              <ma14:wrappingTextBoxFlag xmlns:ma14="http://schemas.microsoft.com/office/mac/drawingml/2011/main" xmlns="" val="1"/>
             </a:ext>
           </a:extLst>
         </p:spPr>
@@ -15519,7 +15566,7 @@
           </a:ln>
           <a:extLst>
             <a:ext uri="{C572A759-6A51-4108-AA02-DFA0A04FC94B}">
-              <ma14:wrappingTextBoxFlag xmlns="" xmlns:ma14="http://schemas.microsoft.com/office/mac/drawingml/2011/main" val="1"/>
+              <ma14:wrappingTextBoxFlag xmlns:ma14="http://schemas.microsoft.com/office/mac/drawingml/2011/main" xmlns="" val="1"/>
             </a:ext>
           </a:extLst>
         </p:spPr>
@@ -15715,7 +15762,7 @@
           </a:ln>
           <a:extLst>
             <a:ext uri="{C572A759-6A51-4108-AA02-DFA0A04FC94B}">
-              <ma14:wrappingTextBoxFlag xmlns="" xmlns:ma14="http://schemas.microsoft.com/office/mac/drawingml/2011/main" val="1"/>
+              <ma14:wrappingTextBoxFlag xmlns:ma14="http://schemas.microsoft.com/office/mac/drawingml/2011/main" xmlns="" val="1"/>
             </a:ext>
           </a:extLst>
         </p:spPr>
@@ -15836,7 +15883,7 @@
           </a:ln>
           <a:extLst>
             <a:ext uri="{C572A759-6A51-4108-AA02-DFA0A04FC94B}">
-              <ma14:wrappingTextBoxFlag xmlns="" xmlns:ma14="http://schemas.microsoft.com/office/mac/drawingml/2011/main" val="1"/>
+              <ma14:wrappingTextBoxFlag xmlns:ma14="http://schemas.microsoft.com/office/mac/drawingml/2011/main" xmlns="" val="1"/>
             </a:ext>
           </a:extLst>
         </p:spPr>
@@ -15933,7 +15980,7 @@
           </a:ln>
           <a:extLst>
             <a:ext uri="{C572A759-6A51-4108-AA02-DFA0A04FC94B}">
-              <ma14:wrappingTextBoxFlag xmlns="" xmlns:ma14="http://schemas.microsoft.com/office/mac/drawingml/2011/main" val="1"/>
+              <ma14:wrappingTextBoxFlag xmlns:ma14="http://schemas.microsoft.com/office/mac/drawingml/2011/main" xmlns="" val="1"/>
             </a:ext>
           </a:extLst>
         </p:spPr>
@@ -16042,7 +16089,7 @@
           </a:ln>
           <a:extLst>
             <a:ext uri="{C572A759-6A51-4108-AA02-DFA0A04FC94B}">
-              <ma14:wrappingTextBoxFlag xmlns="" xmlns:ma14="http://schemas.microsoft.com/office/mac/drawingml/2011/main" val="1"/>
+              <ma14:wrappingTextBoxFlag xmlns:ma14="http://schemas.microsoft.com/office/mac/drawingml/2011/main" xmlns="" val="1"/>
             </a:ext>
           </a:extLst>
         </p:spPr>
@@ -16096,7 +16143,7 @@
           </a:ln>
           <a:extLst>
             <a:ext uri="{C572A759-6A51-4108-AA02-DFA0A04FC94B}">
-              <ma14:wrappingTextBoxFlag xmlns="" xmlns:ma14="http://schemas.microsoft.com/office/mac/drawingml/2011/main" val="1"/>
+              <ma14:wrappingTextBoxFlag xmlns:ma14="http://schemas.microsoft.com/office/mac/drawingml/2011/main" xmlns="" val="1"/>
             </a:ext>
           </a:extLst>
         </p:spPr>
@@ -16346,7 +16393,7 @@
           </a:ln>
           <a:extLst>
             <a:ext uri="{C572A759-6A51-4108-AA02-DFA0A04FC94B}">
-              <ma14:wrappingTextBoxFlag xmlns="" xmlns:ma14="http://schemas.microsoft.com/office/mac/drawingml/2011/main" val="1"/>
+              <ma14:wrappingTextBoxFlag xmlns:ma14="http://schemas.microsoft.com/office/mac/drawingml/2011/main" xmlns="" val="1"/>
             </a:ext>
           </a:extLst>
         </p:spPr>
@@ -16455,7 +16502,7 @@
           </a:ln>
           <a:extLst>
             <a:ext uri="{C572A759-6A51-4108-AA02-DFA0A04FC94B}">
-              <ma14:wrappingTextBoxFlag xmlns="" xmlns:ma14="http://schemas.microsoft.com/office/mac/drawingml/2011/main" val="1"/>
+              <ma14:wrappingTextBoxFlag xmlns:ma14="http://schemas.microsoft.com/office/mac/drawingml/2011/main" xmlns="" val="1"/>
             </a:ext>
           </a:extLst>
         </p:spPr>
@@ -16502,7 +16549,7 @@
           </a:ln>
           <a:extLst>
             <a:ext uri="{C572A759-6A51-4108-AA02-DFA0A04FC94B}">
-              <ma14:wrappingTextBoxFlag xmlns="" xmlns:ma14="http://schemas.microsoft.com/office/mac/drawingml/2011/main" val="1"/>
+              <ma14:wrappingTextBoxFlag xmlns:ma14="http://schemas.microsoft.com/office/mac/drawingml/2011/main" xmlns="" val="1"/>
             </a:ext>
           </a:extLst>
         </p:spPr>
@@ -16594,7 +16641,7 @@
           </a:ln>
           <a:extLst>
             <a:ext uri="{C572A759-6A51-4108-AA02-DFA0A04FC94B}">
-              <ma14:wrappingTextBoxFlag xmlns="" xmlns:ma14="http://schemas.microsoft.com/office/mac/drawingml/2011/main" val="1"/>
+              <ma14:wrappingTextBoxFlag xmlns:ma14="http://schemas.microsoft.com/office/mac/drawingml/2011/main" xmlns="" val="1"/>
             </a:ext>
           </a:extLst>
         </p:spPr>
@@ -16703,7 +16750,7 @@
           </a:ln>
           <a:extLst>
             <a:ext uri="{C572A759-6A51-4108-AA02-DFA0A04FC94B}">
-              <ma14:wrappingTextBoxFlag xmlns="" xmlns:ma14="http://schemas.microsoft.com/office/mac/drawingml/2011/main" val="1"/>
+              <ma14:wrappingTextBoxFlag xmlns:ma14="http://schemas.microsoft.com/office/mac/drawingml/2011/main" xmlns="" val="1"/>
             </a:ext>
           </a:extLst>
         </p:spPr>
@@ -16750,7 +16797,7 @@
           </a:ln>
           <a:extLst>
             <a:ext uri="{C572A759-6A51-4108-AA02-DFA0A04FC94B}">
-              <ma14:wrappingTextBoxFlag xmlns="" xmlns:ma14="http://schemas.microsoft.com/office/mac/drawingml/2011/main" val="1"/>
+              <ma14:wrappingTextBoxFlag xmlns:ma14="http://schemas.microsoft.com/office/mac/drawingml/2011/main" xmlns="" val="1"/>
             </a:ext>
           </a:extLst>
         </p:spPr>
@@ -16842,7 +16889,7 @@
           </a:ln>
           <a:extLst>
             <a:ext uri="{C572A759-6A51-4108-AA02-DFA0A04FC94B}">
-              <ma14:wrappingTextBoxFlag xmlns="" xmlns:ma14="http://schemas.microsoft.com/office/mac/drawingml/2011/main" val="1"/>
+              <ma14:wrappingTextBoxFlag xmlns:ma14="http://schemas.microsoft.com/office/mac/drawingml/2011/main" xmlns="" val="1"/>
             </a:ext>
           </a:extLst>
         </p:spPr>
@@ -16934,7 +16981,7 @@
           </a:ln>
           <a:extLst>
             <a:ext uri="{C572A759-6A51-4108-AA02-DFA0A04FC94B}">
-              <ma14:wrappingTextBoxFlag xmlns="" xmlns:ma14="http://schemas.microsoft.com/office/mac/drawingml/2011/main" val="1"/>
+              <ma14:wrappingTextBoxFlag xmlns:ma14="http://schemas.microsoft.com/office/mac/drawingml/2011/main" xmlns="" val="1"/>
             </a:ext>
           </a:extLst>
         </p:spPr>

</xml_diff>

<commit_message>
Updated an into slide
</commit_message>
<xml_diff>
--- a/Session01/Session1_Slides.pptx
+++ b/Session01/Session1_Slides.pptx
@@ -932,7 +932,7 @@
           <a:p>
             <a:fld id="{5B849520-1930-4CF7-AFD0-1B7449654BAD}" type="datetimeFigureOut">
               <a:rPr lang="en-US" smtClean="0"/>
-              <a:t>11/6/23</a:t>
+              <a:t>1/26/24</a:t>
             </a:fld>
             <a:endParaRPr lang="en-US"/>
           </a:p>
@@ -5422,7 +5422,7 @@
           </a:ln>
           <a:extLst>
             <a:ext uri="{C572A759-6A51-4108-AA02-DFA0A04FC94B}">
-              <ma14:wrappingTextBoxFlag xmlns:ma14="http://schemas.microsoft.com/office/mac/drawingml/2011/main" xmlns="" val="1"/>
+              <ma14:wrappingTextBoxFlag xmlns="" xmlns:ma14="http://schemas.microsoft.com/office/mac/drawingml/2011/main" val="1"/>
             </a:ext>
           </a:extLst>
         </p:spPr>
@@ -5461,7 +5461,7 @@
           </a:ln>
           <a:extLst>
             <a:ext uri="{C572A759-6A51-4108-AA02-DFA0A04FC94B}">
-              <ma14:wrappingTextBoxFlag xmlns:ma14="http://schemas.microsoft.com/office/mac/drawingml/2011/main" xmlns="" val="1"/>
+              <ma14:wrappingTextBoxFlag xmlns="" xmlns:ma14="http://schemas.microsoft.com/office/mac/drawingml/2011/main" val="1"/>
             </a:ext>
           </a:extLst>
         </p:spPr>
@@ -6655,7 +6655,7 @@
           </a:ln>
           <a:extLst>
             <a:ext uri="{C572A759-6A51-4108-AA02-DFA0A04FC94B}">
-              <ma14:wrappingTextBoxFlag xmlns:ma14="http://schemas.microsoft.com/office/mac/drawingml/2011/main" xmlns="" val="1"/>
+              <ma14:wrappingTextBoxFlag xmlns="" xmlns:ma14="http://schemas.microsoft.com/office/mac/drawingml/2011/main" val="1"/>
             </a:ext>
           </a:extLst>
         </p:spPr>
@@ -6704,7 +6704,7 @@
           </a:ln>
           <a:extLst>
             <a:ext uri="{C572A759-6A51-4108-AA02-DFA0A04FC94B}">
-              <ma14:wrappingTextBoxFlag xmlns:ma14="http://schemas.microsoft.com/office/mac/drawingml/2011/main" xmlns="" val="1"/>
+              <ma14:wrappingTextBoxFlag xmlns="" xmlns:ma14="http://schemas.microsoft.com/office/mac/drawingml/2011/main" val="1"/>
             </a:ext>
           </a:extLst>
         </p:spPr>
@@ -6815,7 +6815,7 @@
           </a:ln>
           <a:extLst>
             <a:ext uri="{C572A759-6A51-4108-AA02-DFA0A04FC94B}">
-              <ma14:wrappingTextBoxFlag xmlns:ma14="http://schemas.microsoft.com/office/mac/drawingml/2011/main" xmlns="" val="1"/>
+              <ma14:wrappingTextBoxFlag xmlns="" xmlns:ma14="http://schemas.microsoft.com/office/mac/drawingml/2011/main" val="1"/>
             </a:ext>
           </a:extLst>
         </p:spPr>
@@ -6862,7 +6862,7 @@
           </a:ln>
           <a:extLst>
             <a:ext uri="{C572A759-6A51-4108-AA02-DFA0A04FC94B}">
-              <ma14:wrappingTextBoxFlag xmlns:ma14="http://schemas.microsoft.com/office/mac/drawingml/2011/main" xmlns="" val="1"/>
+              <ma14:wrappingTextBoxFlag xmlns="" xmlns:ma14="http://schemas.microsoft.com/office/mac/drawingml/2011/main" val="1"/>
             </a:ext>
           </a:extLst>
         </p:spPr>
@@ -6963,7 +6963,7 @@
           </a:ln>
           <a:extLst>
             <a:ext uri="{C572A759-6A51-4108-AA02-DFA0A04FC94B}">
-              <ma14:wrappingTextBoxFlag xmlns:ma14="http://schemas.microsoft.com/office/mac/drawingml/2011/main" xmlns="" val="1"/>
+              <ma14:wrappingTextBoxFlag xmlns="" xmlns:ma14="http://schemas.microsoft.com/office/mac/drawingml/2011/main" val="1"/>
             </a:ext>
           </a:extLst>
         </p:spPr>
@@ -7117,7 +7117,7 @@
           </a:ln>
           <a:extLst>
             <a:ext uri="{C572A759-6A51-4108-AA02-DFA0A04FC94B}">
-              <ma14:wrappingTextBoxFlag xmlns:ma14="http://schemas.microsoft.com/office/mac/drawingml/2011/main" xmlns="" val="1"/>
+              <ma14:wrappingTextBoxFlag xmlns="" xmlns:ma14="http://schemas.microsoft.com/office/mac/drawingml/2011/main" val="1"/>
             </a:ext>
           </a:extLst>
         </p:spPr>
@@ -7164,7 +7164,7 @@
           </a:ln>
           <a:extLst>
             <a:ext uri="{C572A759-6A51-4108-AA02-DFA0A04FC94B}">
-              <ma14:wrappingTextBoxFlag xmlns:ma14="http://schemas.microsoft.com/office/mac/drawingml/2011/main" xmlns="" val="1"/>
+              <ma14:wrappingTextBoxFlag xmlns="" xmlns:ma14="http://schemas.microsoft.com/office/mac/drawingml/2011/main" val="1"/>
             </a:ext>
           </a:extLst>
         </p:spPr>
@@ -7256,7 +7256,7 @@
           </a:ln>
           <a:extLst>
             <a:ext uri="{C572A759-6A51-4108-AA02-DFA0A04FC94B}">
-              <ma14:wrappingTextBoxFlag xmlns:ma14="http://schemas.microsoft.com/office/mac/drawingml/2011/main" xmlns="" val="1"/>
+              <ma14:wrappingTextBoxFlag xmlns="" xmlns:ma14="http://schemas.microsoft.com/office/mac/drawingml/2011/main" val="1"/>
             </a:ext>
           </a:extLst>
         </p:spPr>
@@ -7463,7 +7463,7 @@
           </a:ln>
           <a:extLst>
             <a:ext uri="{C572A759-6A51-4108-AA02-DFA0A04FC94B}">
-              <ma14:wrappingTextBoxFlag xmlns:ma14="http://schemas.microsoft.com/office/mac/drawingml/2011/main" xmlns="" val="1"/>
+              <ma14:wrappingTextBoxFlag xmlns="" xmlns:ma14="http://schemas.microsoft.com/office/mac/drawingml/2011/main" val="1"/>
             </a:ext>
           </a:extLst>
         </p:spPr>
@@ -7572,7 +7572,7 @@
           </a:ln>
           <a:extLst>
             <a:ext uri="{C572A759-6A51-4108-AA02-DFA0A04FC94B}">
-              <ma14:wrappingTextBoxFlag xmlns:ma14="http://schemas.microsoft.com/office/mac/drawingml/2011/main" xmlns="" val="1"/>
+              <ma14:wrappingTextBoxFlag xmlns="" xmlns:ma14="http://schemas.microsoft.com/office/mac/drawingml/2011/main" val="1"/>
             </a:ext>
           </a:extLst>
         </p:spPr>
@@ -7765,7 +7765,7 @@
           </a:ln>
           <a:extLst>
             <a:ext uri="{C572A759-6A51-4108-AA02-DFA0A04FC94B}">
-              <ma14:wrappingTextBoxFlag xmlns:ma14="http://schemas.microsoft.com/office/mac/drawingml/2011/main" xmlns="" val="1"/>
+              <ma14:wrappingTextBoxFlag xmlns="" xmlns:ma14="http://schemas.microsoft.com/office/mac/drawingml/2011/main" val="1"/>
             </a:ext>
           </a:extLst>
         </p:spPr>
@@ -7896,7 +7896,7 @@
           </a:ln>
           <a:extLst>
             <a:ext uri="{C572A759-6A51-4108-AA02-DFA0A04FC94B}">
-              <ma14:wrappingTextBoxFlag xmlns:ma14="http://schemas.microsoft.com/office/mac/drawingml/2011/main" xmlns="" val="1"/>
+              <ma14:wrappingTextBoxFlag xmlns="" xmlns:ma14="http://schemas.microsoft.com/office/mac/drawingml/2011/main" val="1"/>
             </a:ext>
           </a:extLst>
         </p:spPr>
@@ -8005,7 +8005,7 @@
           </a:ln>
           <a:extLst>
             <a:ext uri="{C572A759-6A51-4108-AA02-DFA0A04FC94B}">
-              <ma14:wrappingTextBoxFlag xmlns:ma14="http://schemas.microsoft.com/office/mac/drawingml/2011/main" xmlns="" val="1"/>
+              <ma14:wrappingTextBoxFlag xmlns="" xmlns:ma14="http://schemas.microsoft.com/office/mac/drawingml/2011/main" val="1"/>
             </a:ext>
           </a:extLst>
         </p:spPr>
@@ -8136,7 +8136,7 @@
           </a:ln>
           <a:extLst>
             <a:ext uri="{C572A759-6A51-4108-AA02-DFA0A04FC94B}">
-              <ma14:wrappingTextBoxFlag xmlns:ma14="http://schemas.microsoft.com/office/mac/drawingml/2011/main" xmlns="" val="1"/>
+              <ma14:wrappingTextBoxFlag xmlns="" xmlns:ma14="http://schemas.microsoft.com/office/mac/drawingml/2011/main" val="1"/>
             </a:ext>
           </a:extLst>
         </p:spPr>
@@ -8316,7 +8316,7 @@
         <p:spPr/>
         <p:txBody>
           <a:bodyPr>
-            <a:normAutofit lnSpcReduction="10000"/>
+            <a:normAutofit fontScale="85000" lnSpcReduction="20000"/>
           </a:bodyPr>
           <a:lstStyle/>
           <a:p>
@@ -8328,6 +8328,12 @@
           <a:p>
             <a:r>
               <a:rPr lang="en-US" dirty="0"/>
+              <a:t>Started Julia in 2023</a:t>
+            </a:r>
+          </a:p>
+          <a:p>
+            <a:r>
+              <a:rPr lang="en-US" dirty="0"/>
               <a:t>VBA since 2011</a:t>
             </a:r>
           </a:p>
@@ -8343,7 +8349,13 @@
           <a:p>
             <a:r>
               <a:rPr lang="en-US" dirty="0"/>
-              <a:t>Ph.D. student, Physics, UC Irvine, 2026</a:t>
+              <a:t>Ph.D. student, Astrophysics, UC Irvine, 2026</a:t>
+            </a:r>
+          </a:p>
+          <a:p>
+            <a:r>
+              <a:rPr lang="en-US" dirty="0"/>
+              <a:t>M.S., Astrophysics, UC Irvine, 2023</a:t>
             </a:r>
           </a:p>
           <a:p>
@@ -8441,7 +8453,7 @@
           </a:ln>
           <a:extLst>
             <a:ext uri="{C572A759-6A51-4108-AA02-DFA0A04FC94B}">
-              <ma14:wrappingTextBoxFlag xmlns:ma14="http://schemas.microsoft.com/office/mac/drawingml/2011/main" xmlns="" val="1"/>
+              <ma14:wrappingTextBoxFlag xmlns="" xmlns:ma14="http://schemas.microsoft.com/office/mac/drawingml/2011/main" val="1"/>
             </a:ext>
           </a:extLst>
         </p:spPr>
@@ -8572,7 +8584,7 @@
           </a:ln>
           <a:extLst>
             <a:ext uri="{C572A759-6A51-4108-AA02-DFA0A04FC94B}">
-              <ma14:wrappingTextBoxFlag xmlns:ma14="http://schemas.microsoft.com/office/mac/drawingml/2011/main" xmlns="" val="1"/>
+              <ma14:wrappingTextBoxFlag xmlns="" xmlns:ma14="http://schemas.microsoft.com/office/mac/drawingml/2011/main" val="1"/>
             </a:ext>
           </a:extLst>
         </p:spPr>
@@ -8703,7 +8715,7 @@
           </a:ln>
           <a:extLst>
             <a:ext uri="{C572A759-6A51-4108-AA02-DFA0A04FC94B}">
-              <ma14:wrappingTextBoxFlag xmlns:ma14="http://schemas.microsoft.com/office/mac/drawingml/2011/main" xmlns="" val="1"/>
+              <ma14:wrappingTextBoxFlag xmlns="" xmlns:ma14="http://schemas.microsoft.com/office/mac/drawingml/2011/main" val="1"/>
             </a:ext>
           </a:extLst>
         </p:spPr>
@@ -8812,7 +8824,7 @@
           </a:ln>
           <a:extLst>
             <a:ext uri="{C572A759-6A51-4108-AA02-DFA0A04FC94B}">
-              <ma14:wrappingTextBoxFlag xmlns:ma14="http://schemas.microsoft.com/office/mac/drawingml/2011/main" xmlns="" val="1"/>
+              <ma14:wrappingTextBoxFlag xmlns="" xmlns:ma14="http://schemas.microsoft.com/office/mac/drawingml/2011/main" val="1"/>
             </a:ext>
           </a:extLst>
         </p:spPr>
@@ -8943,7 +8955,7 @@
           </a:ln>
           <a:extLst>
             <a:ext uri="{C572A759-6A51-4108-AA02-DFA0A04FC94B}">
-              <ma14:wrappingTextBoxFlag xmlns:ma14="http://schemas.microsoft.com/office/mac/drawingml/2011/main" xmlns="" val="1"/>
+              <ma14:wrappingTextBoxFlag xmlns="" xmlns:ma14="http://schemas.microsoft.com/office/mac/drawingml/2011/main" val="1"/>
             </a:ext>
           </a:extLst>
         </p:spPr>
@@ -9074,7 +9086,7 @@
           </a:ln>
           <a:extLst>
             <a:ext uri="{C572A759-6A51-4108-AA02-DFA0A04FC94B}">
-              <ma14:wrappingTextBoxFlag xmlns:ma14="http://schemas.microsoft.com/office/mac/drawingml/2011/main" xmlns="" val="1"/>
+              <ma14:wrappingTextBoxFlag xmlns="" xmlns:ma14="http://schemas.microsoft.com/office/mac/drawingml/2011/main" val="1"/>
             </a:ext>
           </a:extLst>
         </p:spPr>
@@ -10669,7 +10681,7 @@
           </a:ln>
           <a:extLst>
             <a:ext uri="{C572A759-6A51-4108-AA02-DFA0A04FC94B}">
-              <ma14:wrappingTextBoxFlag xmlns:ma14="http://schemas.microsoft.com/office/mac/drawingml/2011/main" xmlns="" val="1"/>
+              <ma14:wrappingTextBoxFlag xmlns="" xmlns:ma14="http://schemas.microsoft.com/office/mac/drawingml/2011/main" val="1"/>
             </a:ext>
           </a:extLst>
         </p:spPr>
@@ -10778,7 +10790,7 @@
           </a:ln>
           <a:extLst>
             <a:ext uri="{C572A759-6A51-4108-AA02-DFA0A04FC94B}">
-              <ma14:wrappingTextBoxFlag xmlns:ma14="http://schemas.microsoft.com/office/mac/drawingml/2011/main" xmlns="" val="1"/>
+              <ma14:wrappingTextBoxFlag xmlns="" xmlns:ma14="http://schemas.microsoft.com/office/mac/drawingml/2011/main" val="1"/>
             </a:ext>
           </a:extLst>
         </p:spPr>
@@ -10870,7 +10882,7 @@
           </a:ln>
           <a:extLst>
             <a:ext uri="{C572A759-6A51-4108-AA02-DFA0A04FC94B}">
-              <ma14:wrappingTextBoxFlag xmlns:ma14="http://schemas.microsoft.com/office/mac/drawingml/2011/main" xmlns="" val="1"/>
+              <ma14:wrappingTextBoxFlag xmlns="" xmlns:ma14="http://schemas.microsoft.com/office/mac/drawingml/2011/main" val="1"/>
             </a:ext>
           </a:extLst>
         </p:spPr>
@@ -11113,7 +11125,7 @@
           </a:ln>
           <a:extLst>
             <a:ext uri="{C572A759-6A51-4108-AA02-DFA0A04FC94B}">
-              <ma14:wrappingTextBoxFlag xmlns:ma14="http://schemas.microsoft.com/office/mac/drawingml/2011/main" xmlns="" val="1"/>
+              <ma14:wrappingTextBoxFlag xmlns="" xmlns:ma14="http://schemas.microsoft.com/office/mac/drawingml/2011/main" val="1"/>
             </a:ext>
           </a:extLst>
         </p:spPr>
@@ -11239,7 +11251,7 @@
           </a:ln>
           <a:extLst>
             <a:ext uri="{C572A759-6A51-4108-AA02-DFA0A04FC94B}">
-              <ma14:wrappingTextBoxFlag xmlns:ma14="http://schemas.microsoft.com/office/mac/drawingml/2011/main" xmlns="" val="1"/>
+              <ma14:wrappingTextBoxFlag xmlns="" xmlns:ma14="http://schemas.microsoft.com/office/mac/drawingml/2011/main" val="1"/>
             </a:ext>
           </a:extLst>
         </p:spPr>
@@ -11286,7 +11298,7 @@
           </a:ln>
           <a:extLst>
             <a:ext uri="{C572A759-6A51-4108-AA02-DFA0A04FC94B}">
-              <ma14:wrappingTextBoxFlag xmlns:ma14="http://schemas.microsoft.com/office/mac/drawingml/2011/main" xmlns="" val="1"/>
+              <ma14:wrappingTextBoxFlag xmlns="" xmlns:ma14="http://schemas.microsoft.com/office/mac/drawingml/2011/main" val="1"/>
             </a:ext>
           </a:extLst>
         </p:spPr>
@@ -11413,7 +11425,7 @@
           </a:ln>
           <a:extLst>
             <a:ext uri="{C572A759-6A51-4108-AA02-DFA0A04FC94B}">
-              <ma14:wrappingTextBoxFlag xmlns:ma14="http://schemas.microsoft.com/office/mac/drawingml/2011/main" xmlns="" val="1"/>
+              <ma14:wrappingTextBoxFlag xmlns="" xmlns:ma14="http://schemas.microsoft.com/office/mac/drawingml/2011/main" val="1"/>
             </a:ext>
           </a:extLst>
         </p:spPr>
@@ -11684,7 +11696,7 @@
           </a:ln>
           <a:extLst>
             <a:ext uri="{C572A759-6A51-4108-AA02-DFA0A04FC94B}">
-              <ma14:wrappingTextBoxFlag xmlns:ma14="http://schemas.microsoft.com/office/mac/drawingml/2011/main" xmlns="" val="1"/>
+              <ma14:wrappingTextBoxFlag xmlns="" xmlns:ma14="http://schemas.microsoft.com/office/mac/drawingml/2011/main" val="1"/>
             </a:ext>
           </a:extLst>
         </p:spPr>
@@ -11731,7 +11743,7 @@
           </a:ln>
           <a:extLst>
             <a:ext uri="{C572A759-6A51-4108-AA02-DFA0A04FC94B}">
-              <ma14:wrappingTextBoxFlag xmlns:ma14="http://schemas.microsoft.com/office/mac/drawingml/2011/main" xmlns="" val="1"/>
+              <ma14:wrappingTextBoxFlag xmlns="" xmlns:ma14="http://schemas.microsoft.com/office/mac/drawingml/2011/main" val="1"/>
             </a:ext>
           </a:extLst>
         </p:spPr>
@@ -11858,7 +11870,7 @@
           </a:ln>
           <a:extLst>
             <a:ext uri="{C572A759-6A51-4108-AA02-DFA0A04FC94B}">
-              <ma14:wrappingTextBoxFlag xmlns:ma14="http://schemas.microsoft.com/office/mac/drawingml/2011/main" xmlns="" val="1"/>
+              <ma14:wrappingTextBoxFlag xmlns="" xmlns:ma14="http://schemas.microsoft.com/office/mac/drawingml/2011/main" val="1"/>
             </a:ext>
           </a:extLst>
         </p:spPr>
@@ -12114,7 +12126,7 @@
           </a:ln>
           <a:extLst>
             <a:ext uri="{C572A759-6A51-4108-AA02-DFA0A04FC94B}">
-              <ma14:wrappingTextBoxFlag xmlns:ma14="http://schemas.microsoft.com/office/mac/drawingml/2011/main" xmlns="" val="1"/>
+              <ma14:wrappingTextBoxFlag xmlns="" xmlns:ma14="http://schemas.microsoft.com/office/mac/drawingml/2011/main" val="1"/>
             </a:ext>
           </a:extLst>
         </p:spPr>
@@ -12451,7 +12463,7 @@
           </a:ln>
           <a:extLst>
             <a:ext uri="{C572A759-6A51-4108-AA02-DFA0A04FC94B}">
-              <ma14:wrappingTextBoxFlag xmlns:ma14="http://schemas.microsoft.com/office/mac/drawingml/2011/main" xmlns="" val="1"/>
+              <ma14:wrappingTextBoxFlag xmlns="" xmlns:ma14="http://schemas.microsoft.com/office/mac/drawingml/2011/main" val="1"/>
             </a:ext>
           </a:extLst>
         </p:spPr>
@@ -12560,7 +12572,7 @@
           </a:ln>
           <a:extLst>
             <a:ext uri="{C572A759-6A51-4108-AA02-DFA0A04FC94B}">
-              <ma14:wrappingTextBoxFlag xmlns:ma14="http://schemas.microsoft.com/office/mac/drawingml/2011/main" xmlns="" val="1"/>
+              <ma14:wrappingTextBoxFlag xmlns="" xmlns:ma14="http://schemas.microsoft.com/office/mac/drawingml/2011/main" val="1"/>
             </a:ext>
           </a:extLst>
         </p:spPr>
@@ -12607,7 +12619,7 @@
           </a:ln>
           <a:extLst>
             <a:ext uri="{C572A759-6A51-4108-AA02-DFA0A04FC94B}">
-              <ma14:wrappingTextBoxFlag xmlns:ma14="http://schemas.microsoft.com/office/mac/drawingml/2011/main" xmlns="" val="1"/>
+              <ma14:wrappingTextBoxFlag xmlns="" xmlns:ma14="http://schemas.microsoft.com/office/mac/drawingml/2011/main" val="1"/>
             </a:ext>
           </a:extLst>
         </p:spPr>
@@ -12859,7 +12871,7 @@
           </a:ln>
           <a:extLst>
             <a:ext uri="{C572A759-6A51-4108-AA02-DFA0A04FC94B}">
-              <ma14:wrappingTextBoxFlag xmlns:ma14="http://schemas.microsoft.com/office/mac/drawingml/2011/main" xmlns="" val="1"/>
+              <ma14:wrappingTextBoxFlag xmlns="" xmlns:ma14="http://schemas.microsoft.com/office/mac/drawingml/2011/main" val="1"/>
             </a:ext>
           </a:extLst>
         </p:spPr>
@@ -12906,7 +12918,7 @@
           </a:ln>
           <a:extLst>
             <a:ext uri="{C572A759-6A51-4108-AA02-DFA0A04FC94B}">
-              <ma14:wrappingTextBoxFlag xmlns:ma14="http://schemas.microsoft.com/office/mac/drawingml/2011/main" xmlns="" val="1"/>
+              <ma14:wrappingTextBoxFlag xmlns="" xmlns:ma14="http://schemas.microsoft.com/office/mac/drawingml/2011/main" val="1"/>
             </a:ext>
           </a:extLst>
         </p:spPr>
@@ -13036,7 +13048,7 @@
           </a:ln>
           <a:extLst>
             <a:ext uri="{C572A759-6A51-4108-AA02-DFA0A04FC94B}">
-              <ma14:wrappingTextBoxFlag xmlns:ma14="http://schemas.microsoft.com/office/mac/drawingml/2011/main" xmlns="" val="1"/>
+              <ma14:wrappingTextBoxFlag xmlns="" xmlns:ma14="http://schemas.microsoft.com/office/mac/drawingml/2011/main" val="1"/>
             </a:ext>
           </a:extLst>
         </p:spPr>
@@ -13145,7 +13157,7 @@
           </a:ln>
           <a:extLst>
             <a:ext uri="{C572A759-6A51-4108-AA02-DFA0A04FC94B}">
-              <ma14:wrappingTextBoxFlag xmlns:ma14="http://schemas.microsoft.com/office/mac/drawingml/2011/main" xmlns="" val="1"/>
+              <ma14:wrappingTextBoxFlag xmlns="" xmlns:ma14="http://schemas.microsoft.com/office/mac/drawingml/2011/main" val="1"/>
             </a:ext>
           </a:extLst>
         </p:spPr>
@@ -13264,7 +13276,7 @@
           </a:ln>
           <a:extLst>
             <a:ext uri="{C572A759-6A51-4108-AA02-DFA0A04FC94B}">
-              <ma14:wrappingTextBoxFlag xmlns:ma14="http://schemas.microsoft.com/office/mac/drawingml/2011/main" xmlns="" val="1"/>
+              <ma14:wrappingTextBoxFlag xmlns="" xmlns:ma14="http://schemas.microsoft.com/office/mac/drawingml/2011/main" val="1"/>
             </a:ext>
           </a:extLst>
         </p:spPr>
@@ -13366,7 +13378,7 @@
           </a:ln>
           <a:extLst>
             <a:ext uri="{C572A759-6A51-4108-AA02-DFA0A04FC94B}">
-              <ma14:wrappingTextBoxFlag xmlns:ma14="http://schemas.microsoft.com/office/mac/drawingml/2011/main" xmlns="" val="1"/>
+              <ma14:wrappingTextBoxFlag xmlns="" xmlns:ma14="http://schemas.microsoft.com/office/mac/drawingml/2011/main" val="1"/>
             </a:ext>
           </a:extLst>
         </p:spPr>
@@ -13574,7 +13586,7 @@
           </a:ln>
           <a:extLst>
             <a:ext uri="{C572A759-6A51-4108-AA02-DFA0A04FC94B}">
-              <ma14:wrappingTextBoxFlag xmlns:ma14="http://schemas.microsoft.com/office/mac/drawingml/2011/main" xmlns="" val="1"/>
+              <ma14:wrappingTextBoxFlag xmlns="" xmlns:ma14="http://schemas.microsoft.com/office/mac/drawingml/2011/main" val="1"/>
             </a:ext>
           </a:extLst>
         </p:spPr>
@@ -13687,7 +13699,7 @@
           </a:ln>
           <a:extLst>
             <a:ext uri="{C572A759-6A51-4108-AA02-DFA0A04FC94B}">
-              <ma14:wrappingTextBoxFlag xmlns:ma14="http://schemas.microsoft.com/office/mac/drawingml/2011/main" xmlns="" val="1"/>
+              <ma14:wrappingTextBoxFlag xmlns="" xmlns:ma14="http://schemas.microsoft.com/office/mac/drawingml/2011/main" val="1"/>
             </a:ext>
           </a:extLst>
         </p:spPr>
@@ -13796,7 +13808,7 @@
           </a:ln>
           <a:extLst>
             <a:ext uri="{C572A759-6A51-4108-AA02-DFA0A04FC94B}">
-              <ma14:wrappingTextBoxFlag xmlns:ma14="http://schemas.microsoft.com/office/mac/drawingml/2011/main" xmlns="" val="1"/>
+              <ma14:wrappingTextBoxFlag xmlns="" xmlns:ma14="http://schemas.microsoft.com/office/mac/drawingml/2011/main" val="1"/>
             </a:ext>
           </a:extLst>
         </p:spPr>
@@ -13898,7 +13910,7 @@
           </a:ln>
           <a:extLst>
             <a:ext uri="{C572A759-6A51-4108-AA02-DFA0A04FC94B}">
-              <ma14:wrappingTextBoxFlag xmlns:ma14="http://schemas.microsoft.com/office/mac/drawingml/2011/main" xmlns="" val="1"/>
+              <ma14:wrappingTextBoxFlag xmlns="" xmlns:ma14="http://schemas.microsoft.com/office/mac/drawingml/2011/main" val="1"/>
             </a:ext>
           </a:extLst>
         </p:spPr>
@@ -14147,7 +14159,7 @@
           </a:ln>
           <a:extLst>
             <a:ext uri="{C572A759-6A51-4108-AA02-DFA0A04FC94B}">
-              <ma14:wrappingTextBoxFlag xmlns:ma14="http://schemas.microsoft.com/office/mac/drawingml/2011/main" xmlns="" val="1"/>
+              <ma14:wrappingTextBoxFlag xmlns="" xmlns:ma14="http://schemas.microsoft.com/office/mac/drawingml/2011/main" val="1"/>
             </a:ext>
           </a:extLst>
         </p:spPr>
@@ -14337,7 +14349,7 @@
           </a:ln>
           <a:extLst>
             <a:ext uri="{C572A759-6A51-4108-AA02-DFA0A04FC94B}">
-              <ma14:wrappingTextBoxFlag xmlns:ma14="http://schemas.microsoft.com/office/mac/drawingml/2011/main" xmlns="" val="1"/>
+              <ma14:wrappingTextBoxFlag xmlns="" xmlns:ma14="http://schemas.microsoft.com/office/mac/drawingml/2011/main" val="1"/>
             </a:ext>
           </a:extLst>
         </p:spPr>
@@ -14474,7 +14486,7 @@
           </a:ln>
           <a:extLst>
             <a:ext uri="{C572A759-6A51-4108-AA02-DFA0A04FC94B}">
-              <ma14:wrappingTextBoxFlag xmlns:ma14="http://schemas.microsoft.com/office/mac/drawingml/2011/main" xmlns="" val="1"/>
+              <ma14:wrappingTextBoxFlag xmlns="" xmlns:ma14="http://schemas.microsoft.com/office/mac/drawingml/2011/main" val="1"/>
             </a:ext>
           </a:extLst>
         </p:spPr>
@@ -14680,7 +14692,7 @@
           </a:ln>
           <a:extLst>
             <a:ext uri="{C572A759-6A51-4108-AA02-DFA0A04FC94B}">
-              <ma14:wrappingTextBoxFlag xmlns:ma14="http://schemas.microsoft.com/office/mac/drawingml/2011/main" xmlns="" val="1"/>
+              <ma14:wrappingTextBoxFlag xmlns="" xmlns:ma14="http://schemas.microsoft.com/office/mac/drawingml/2011/main" val="1"/>
             </a:ext>
           </a:extLst>
         </p:spPr>
@@ -14811,7 +14823,7 @@
           </a:ln>
           <a:extLst>
             <a:ext uri="{C572A759-6A51-4108-AA02-DFA0A04FC94B}">
-              <ma14:wrappingTextBoxFlag xmlns:ma14="http://schemas.microsoft.com/office/mac/drawingml/2011/main" xmlns="" val="1"/>
+              <ma14:wrappingTextBoxFlag xmlns="" xmlns:ma14="http://schemas.microsoft.com/office/mac/drawingml/2011/main" val="1"/>
             </a:ext>
           </a:extLst>
         </p:spPr>
@@ -15145,7 +15157,7 @@
           </a:ln>
           <a:extLst>
             <a:ext uri="{C572A759-6A51-4108-AA02-DFA0A04FC94B}">
-              <ma14:wrappingTextBoxFlag xmlns:ma14="http://schemas.microsoft.com/office/mac/drawingml/2011/main" xmlns="" val="1"/>
+              <ma14:wrappingTextBoxFlag xmlns="" xmlns:ma14="http://schemas.microsoft.com/office/mac/drawingml/2011/main" val="1"/>
             </a:ext>
           </a:extLst>
         </p:spPr>
@@ -15254,7 +15266,7 @@
           </a:ln>
           <a:extLst>
             <a:ext uri="{C572A759-6A51-4108-AA02-DFA0A04FC94B}">
-              <ma14:wrappingTextBoxFlag xmlns:ma14="http://schemas.microsoft.com/office/mac/drawingml/2011/main" xmlns="" val="1"/>
+              <ma14:wrappingTextBoxFlag xmlns="" xmlns:ma14="http://schemas.microsoft.com/office/mac/drawingml/2011/main" val="1"/>
             </a:ext>
           </a:extLst>
         </p:spPr>
@@ -15474,7 +15486,7 @@
           </a:ln>
           <a:extLst>
             <a:ext uri="{C572A759-6A51-4108-AA02-DFA0A04FC94B}">
-              <ma14:wrappingTextBoxFlag xmlns:ma14="http://schemas.microsoft.com/office/mac/drawingml/2011/main" xmlns="" val="1"/>
+              <ma14:wrappingTextBoxFlag xmlns="" xmlns:ma14="http://schemas.microsoft.com/office/mac/drawingml/2011/main" val="1"/>
             </a:ext>
           </a:extLst>
         </p:spPr>
@@ -15566,7 +15578,7 @@
           </a:ln>
           <a:extLst>
             <a:ext uri="{C572A759-6A51-4108-AA02-DFA0A04FC94B}">
-              <ma14:wrappingTextBoxFlag xmlns:ma14="http://schemas.microsoft.com/office/mac/drawingml/2011/main" xmlns="" val="1"/>
+              <ma14:wrappingTextBoxFlag xmlns="" xmlns:ma14="http://schemas.microsoft.com/office/mac/drawingml/2011/main" val="1"/>
             </a:ext>
           </a:extLst>
         </p:spPr>
@@ -15762,7 +15774,7 @@
           </a:ln>
           <a:extLst>
             <a:ext uri="{C572A759-6A51-4108-AA02-DFA0A04FC94B}">
-              <ma14:wrappingTextBoxFlag xmlns:ma14="http://schemas.microsoft.com/office/mac/drawingml/2011/main" xmlns="" val="1"/>
+              <ma14:wrappingTextBoxFlag xmlns="" xmlns:ma14="http://schemas.microsoft.com/office/mac/drawingml/2011/main" val="1"/>
             </a:ext>
           </a:extLst>
         </p:spPr>
@@ -15883,7 +15895,7 @@
           </a:ln>
           <a:extLst>
             <a:ext uri="{C572A759-6A51-4108-AA02-DFA0A04FC94B}">
-              <ma14:wrappingTextBoxFlag xmlns:ma14="http://schemas.microsoft.com/office/mac/drawingml/2011/main" xmlns="" val="1"/>
+              <ma14:wrappingTextBoxFlag xmlns="" xmlns:ma14="http://schemas.microsoft.com/office/mac/drawingml/2011/main" val="1"/>
             </a:ext>
           </a:extLst>
         </p:spPr>
@@ -15980,7 +15992,7 @@
           </a:ln>
           <a:extLst>
             <a:ext uri="{C572A759-6A51-4108-AA02-DFA0A04FC94B}">
-              <ma14:wrappingTextBoxFlag xmlns:ma14="http://schemas.microsoft.com/office/mac/drawingml/2011/main" xmlns="" val="1"/>
+              <ma14:wrappingTextBoxFlag xmlns="" xmlns:ma14="http://schemas.microsoft.com/office/mac/drawingml/2011/main" val="1"/>
             </a:ext>
           </a:extLst>
         </p:spPr>
@@ -16089,7 +16101,7 @@
           </a:ln>
           <a:extLst>
             <a:ext uri="{C572A759-6A51-4108-AA02-DFA0A04FC94B}">
-              <ma14:wrappingTextBoxFlag xmlns:ma14="http://schemas.microsoft.com/office/mac/drawingml/2011/main" xmlns="" val="1"/>
+              <ma14:wrappingTextBoxFlag xmlns="" xmlns:ma14="http://schemas.microsoft.com/office/mac/drawingml/2011/main" val="1"/>
             </a:ext>
           </a:extLst>
         </p:spPr>
@@ -16143,7 +16155,7 @@
           </a:ln>
           <a:extLst>
             <a:ext uri="{C572A759-6A51-4108-AA02-DFA0A04FC94B}">
-              <ma14:wrappingTextBoxFlag xmlns:ma14="http://schemas.microsoft.com/office/mac/drawingml/2011/main" xmlns="" val="1"/>
+              <ma14:wrappingTextBoxFlag xmlns="" xmlns:ma14="http://schemas.microsoft.com/office/mac/drawingml/2011/main" val="1"/>
             </a:ext>
           </a:extLst>
         </p:spPr>
@@ -16393,7 +16405,7 @@
           </a:ln>
           <a:extLst>
             <a:ext uri="{C572A759-6A51-4108-AA02-DFA0A04FC94B}">
-              <ma14:wrappingTextBoxFlag xmlns:ma14="http://schemas.microsoft.com/office/mac/drawingml/2011/main" xmlns="" val="1"/>
+              <ma14:wrappingTextBoxFlag xmlns="" xmlns:ma14="http://schemas.microsoft.com/office/mac/drawingml/2011/main" val="1"/>
             </a:ext>
           </a:extLst>
         </p:spPr>
@@ -16502,7 +16514,7 @@
           </a:ln>
           <a:extLst>
             <a:ext uri="{C572A759-6A51-4108-AA02-DFA0A04FC94B}">
-              <ma14:wrappingTextBoxFlag xmlns:ma14="http://schemas.microsoft.com/office/mac/drawingml/2011/main" xmlns="" val="1"/>
+              <ma14:wrappingTextBoxFlag xmlns="" xmlns:ma14="http://schemas.microsoft.com/office/mac/drawingml/2011/main" val="1"/>
             </a:ext>
           </a:extLst>
         </p:spPr>
@@ -16549,7 +16561,7 @@
           </a:ln>
           <a:extLst>
             <a:ext uri="{C572A759-6A51-4108-AA02-DFA0A04FC94B}">
-              <ma14:wrappingTextBoxFlag xmlns:ma14="http://schemas.microsoft.com/office/mac/drawingml/2011/main" xmlns="" val="1"/>
+              <ma14:wrappingTextBoxFlag xmlns="" xmlns:ma14="http://schemas.microsoft.com/office/mac/drawingml/2011/main" val="1"/>
             </a:ext>
           </a:extLst>
         </p:spPr>
@@ -16641,7 +16653,7 @@
           </a:ln>
           <a:extLst>
             <a:ext uri="{C572A759-6A51-4108-AA02-DFA0A04FC94B}">
-              <ma14:wrappingTextBoxFlag xmlns:ma14="http://schemas.microsoft.com/office/mac/drawingml/2011/main" xmlns="" val="1"/>
+              <ma14:wrappingTextBoxFlag xmlns="" xmlns:ma14="http://schemas.microsoft.com/office/mac/drawingml/2011/main" val="1"/>
             </a:ext>
           </a:extLst>
         </p:spPr>
@@ -16750,7 +16762,7 @@
           </a:ln>
           <a:extLst>
             <a:ext uri="{C572A759-6A51-4108-AA02-DFA0A04FC94B}">
-              <ma14:wrappingTextBoxFlag xmlns:ma14="http://schemas.microsoft.com/office/mac/drawingml/2011/main" xmlns="" val="1"/>
+              <ma14:wrappingTextBoxFlag xmlns="" xmlns:ma14="http://schemas.microsoft.com/office/mac/drawingml/2011/main" val="1"/>
             </a:ext>
           </a:extLst>
         </p:spPr>
@@ -16797,7 +16809,7 @@
           </a:ln>
           <a:extLst>
             <a:ext uri="{C572A759-6A51-4108-AA02-DFA0A04FC94B}">
-              <ma14:wrappingTextBoxFlag xmlns:ma14="http://schemas.microsoft.com/office/mac/drawingml/2011/main" xmlns="" val="1"/>
+              <ma14:wrappingTextBoxFlag xmlns="" xmlns:ma14="http://schemas.microsoft.com/office/mac/drawingml/2011/main" val="1"/>
             </a:ext>
           </a:extLst>
         </p:spPr>
@@ -16889,7 +16901,7 @@
           </a:ln>
           <a:extLst>
             <a:ext uri="{C572A759-6A51-4108-AA02-DFA0A04FC94B}">
-              <ma14:wrappingTextBoxFlag xmlns:ma14="http://schemas.microsoft.com/office/mac/drawingml/2011/main" xmlns="" val="1"/>
+              <ma14:wrappingTextBoxFlag xmlns="" xmlns:ma14="http://schemas.microsoft.com/office/mac/drawingml/2011/main" val="1"/>
             </a:ext>
           </a:extLst>
         </p:spPr>
@@ -16981,7 +16993,7 @@
           </a:ln>
           <a:extLst>
             <a:ext uri="{C572A759-6A51-4108-AA02-DFA0A04FC94B}">
-              <ma14:wrappingTextBoxFlag xmlns:ma14="http://schemas.microsoft.com/office/mac/drawingml/2011/main" xmlns="" val="1"/>
+              <ma14:wrappingTextBoxFlag xmlns="" xmlns:ma14="http://schemas.microsoft.com/office/mac/drawingml/2011/main" val="1"/>
             </a:ext>
           </a:extLst>
         </p:spPr>

</xml_diff>